<commit_message>
K means clustering is added.
</commit_message>
<xml_diff>
--- a/MachineLearning/K-MeansClustering.pptx
+++ b/MachineLearning/K-MeansClustering.pptx
@@ -5,12 +5,23 @@
     <p:sldMasterId id="2147483648" r:id="rId1"/>
   </p:sldMasterIdLst>
   <p:notesMasterIdLst>
-    <p:notesMasterId r:id="rId5"/>
+    <p:notesMasterId r:id="rId16"/>
   </p:notesMasterIdLst>
   <p:sldIdLst>
     <p:sldId id="256" r:id="rId2"/>
-    <p:sldId id="268" r:id="rId3"/>
-    <p:sldId id="269" r:id="rId4"/>
+    <p:sldId id="270" r:id="rId3"/>
+    <p:sldId id="271" r:id="rId4"/>
+    <p:sldId id="272" r:id="rId5"/>
+    <p:sldId id="273" r:id="rId6"/>
+    <p:sldId id="274" r:id="rId7"/>
+    <p:sldId id="275" r:id="rId8"/>
+    <p:sldId id="276" r:id="rId9"/>
+    <p:sldId id="277" r:id="rId10"/>
+    <p:sldId id="282" r:id="rId11"/>
+    <p:sldId id="281" r:id="rId12"/>
+    <p:sldId id="279" r:id="rId13"/>
+    <p:sldId id="280" r:id="rId14"/>
+    <p:sldId id="269" r:id="rId15"/>
   </p:sldIdLst>
   <p:sldSz cx="9144000" cy="6858000" type="screen4x3"/>
   <p:notesSz cx="6858000" cy="9144000"/>
@@ -195,7 +206,7 @@
             <a:fld id="{98BFDCCA-FFB9-49F6-B56E-F6432283D67C}" type="datetimeFigureOut">
               <a:rPr lang="en-US" smtClean="0"/>
               <a:pPr/>
-              <a:t>12/16/2022</a:t>
+              <a:t>12/28/2022</a:t>
             </a:fld>
             <a:endParaRPr lang="en-US"/>
           </a:p>
@@ -461,6 +472,461 @@
 </p:notesMaster>
 </file>
 
+<file path=ppt/notesSlides/notesSlide1.xml><?xml version="1.0" encoding="utf-8"?>
+<p:notes xmlns:a="http://schemas.openxmlformats.org/drawingml/2006/main" xmlns:r="http://schemas.openxmlformats.org/officeDocument/2006/relationships" xmlns:p="http://schemas.openxmlformats.org/presentationml/2006/main">
+  <p:cSld>
+    <p:spTree>
+      <p:nvGrpSpPr>
+        <p:cNvPr id="1" name=""/>
+        <p:cNvGrpSpPr/>
+        <p:nvPr/>
+      </p:nvGrpSpPr>
+      <p:grpSpPr>
+        <a:xfrm>
+          <a:off x="0" y="0"/>
+          <a:ext cx="0" cy="0"/>
+          <a:chOff x="0" y="0"/>
+          <a:chExt cx="0" cy="0"/>
+        </a:xfrm>
+      </p:grpSpPr>
+      <p:sp>
+        <p:nvSpPr>
+          <p:cNvPr id="2" name="Slide Image Placeholder 1"/>
+          <p:cNvSpPr>
+            <a:spLocks noGrp="1" noRot="1" noChangeAspect="1"/>
+          </p:cNvSpPr>
+          <p:nvPr>
+            <p:ph type="sldImg"/>
+          </p:nvPr>
+        </p:nvSpPr>
+        <p:spPr/>
+      </p:sp>
+      <p:sp>
+        <p:nvSpPr>
+          <p:cNvPr id="3" name="Notes Placeholder 2"/>
+          <p:cNvSpPr>
+            <a:spLocks noGrp="1"/>
+          </p:cNvSpPr>
+          <p:nvPr>
+            <p:ph type="body" idx="1"/>
+          </p:nvPr>
+        </p:nvSpPr>
+        <p:spPr/>
+        <p:txBody>
+          <a:bodyPr>
+            <a:normAutofit/>
+          </a:bodyPr>
+          <a:lstStyle/>
+          <a:p>
+            <a:r>
+              <a:rPr lang="en-US" dirty="0" smtClean="0"/>
+              <a:t>All type + examples + GAN</a:t>
+            </a:r>
+          </a:p>
+          <a:p>
+            <a:endParaRPr lang="en-US" dirty="0" smtClean="0"/>
+          </a:p>
+          <a:p>
+            <a:endParaRPr lang="en-US" dirty="0"/>
+          </a:p>
+        </p:txBody>
+      </p:sp>
+      <p:sp>
+        <p:nvSpPr>
+          <p:cNvPr id="4" name="Slide Number Placeholder 3"/>
+          <p:cNvSpPr>
+            <a:spLocks noGrp="1"/>
+          </p:cNvSpPr>
+          <p:nvPr>
+            <p:ph type="sldNum" sz="quarter" idx="10"/>
+          </p:nvPr>
+        </p:nvSpPr>
+        <p:spPr/>
+        <p:txBody>
+          <a:bodyPr/>
+          <a:lstStyle/>
+          <a:p>
+            <a:fld id="{F11CF66E-94DE-4C09-8ACB-78AEC241243A}" type="slidenum">
+              <a:rPr lang="en-US" smtClean="0"/>
+              <a:pPr/>
+              <a:t>4</a:t>
+            </a:fld>
+            <a:endParaRPr lang="en-US"/>
+          </a:p>
+        </p:txBody>
+      </p:sp>
+    </p:spTree>
+  </p:cSld>
+  <p:clrMapOvr>
+    <a:masterClrMapping/>
+  </p:clrMapOvr>
+</p:notes>
+</file>
+
+<file path=ppt/notesSlides/notesSlide2.xml><?xml version="1.0" encoding="utf-8"?>
+<p:notes xmlns:a="http://schemas.openxmlformats.org/drawingml/2006/main" xmlns:r="http://schemas.openxmlformats.org/officeDocument/2006/relationships" xmlns:p="http://schemas.openxmlformats.org/presentationml/2006/main">
+  <p:cSld>
+    <p:spTree>
+      <p:nvGrpSpPr>
+        <p:cNvPr id="1" name=""/>
+        <p:cNvGrpSpPr/>
+        <p:nvPr/>
+      </p:nvGrpSpPr>
+      <p:grpSpPr>
+        <a:xfrm>
+          <a:off x="0" y="0"/>
+          <a:ext cx="0" cy="0"/>
+          <a:chOff x="0" y="0"/>
+          <a:chExt cx="0" cy="0"/>
+        </a:xfrm>
+      </p:grpSpPr>
+      <p:sp>
+        <p:nvSpPr>
+          <p:cNvPr id="2" name="Slide Image Placeholder 1"/>
+          <p:cNvSpPr>
+            <a:spLocks noGrp="1" noRot="1" noChangeAspect="1"/>
+          </p:cNvSpPr>
+          <p:nvPr>
+            <p:ph type="sldImg"/>
+          </p:nvPr>
+        </p:nvSpPr>
+        <p:spPr/>
+      </p:sp>
+      <p:sp>
+        <p:nvSpPr>
+          <p:cNvPr id="3" name="Notes Placeholder 2"/>
+          <p:cNvSpPr>
+            <a:spLocks noGrp="1"/>
+          </p:cNvSpPr>
+          <p:nvPr>
+            <p:ph type="body" idx="1"/>
+          </p:nvPr>
+        </p:nvSpPr>
+        <p:spPr/>
+        <p:txBody>
+          <a:bodyPr>
+            <a:normAutofit/>
+          </a:bodyPr>
+          <a:lstStyle/>
+          <a:p>
+            <a:r>
+              <a:rPr lang="en-US" dirty="0" smtClean="0"/>
+              <a:t>All type + examples + GAN</a:t>
+            </a:r>
+          </a:p>
+          <a:p>
+            <a:endParaRPr lang="en-US" dirty="0" smtClean="0"/>
+          </a:p>
+          <a:p>
+            <a:endParaRPr lang="en-US" dirty="0"/>
+          </a:p>
+        </p:txBody>
+      </p:sp>
+      <p:sp>
+        <p:nvSpPr>
+          <p:cNvPr id="4" name="Slide Number Placeholder 3"/>
+          <p:cNvSpPr>
+            <a:spLocks noGrp="1"/>
+          </p:cNvSpPr>
+          <p:nvPr>
+            <p:ph type="sldNum" sz="quarter" idx="10"/>
+          </p:nvPr>
+        </p:nvSpPr>
+        <p:spPr/>
+        <p:txBody>
+          <a:bodyPr/>
+          <a:lstStyle/>
+          <a:p>
+            <a:fld id="{F11CF66E-94DE-4C09-8ACB-78AEC241243A}" type="slidenum">
+              <a:rPr lang="en-US" smtClean="0"/>
+              <a:pPr/>
+              <a:t>5</a:t>
+            </a:fld>
+            <a:endParaRPr lang="en-US"/>
+          </a:p>
+        </p:txBody>
+      </p:sp>
+    </p:spTree>
+  </p:cSld>
+  <p:clrMapOvr>
+    <a:masterClrMapping/>
+  </p:clrMapOvr>
+</p:notes>
+</file>
+
+<file path=ppt/notesSlides/notesSlide3.xml><?xml version="1.0" encoding="utf-8"?>
+<p:notes xmlns:a="http://schemas.openxmlformats.org/drawingml/2006/main" xmlns:r="http://schemas.openxmlformats.org/officeDocument/2006/relationships" xmlns:p="http://schemas.openxmlformats.org/presentationml/2006/main">
+  <p:cSld>
+    <p:spTree>
+      <p:nvGrpSpPr>
+        <p:cNvPr id="1" name=""/>
+        <p:cNvGrpSpPr/>
+        <p:nvPr/>
+      </p:nvGrpSpPr>
+      <p:grpSpPr>
+        <a:xfrm>
+          <a:off x="0" y="0"/>
+          <a:ext cx="0" cy="0"/>
+          <a:chOff x="0" y="0"/>
+          <a:chExt cx="0" cy="0"/>
+        </a:xfrm>
+      </p:grpSpPr>
+      <p:sp>
+        <p:nvSpPr>
+          <p:cNvPr id="2" name="Slide Image Placeholder 1"/>
+          <p:cNvSpPr>
+            <a:spLocks noGrp="1" noRot="1" noChangeAspect="1"/>
+          </p:cNvSpPr>
+          <p:nvPr>
+            <p:ph type="sldImg"/>
+          </p:nvPr>
+        </p:nvSpPr>
+        <p:spPr/>
+      </p:sp>
+      <p:sp>
+        <p:nvSpPr>
+          <p:cNvPr id="3" name="Notes Placeholder 2"/>
+          <p:cNvSpPr>
+            <a:spLocks noGrp="1"/>
+          </p:cNvSpPr>
+          <p:nvPr>
+            <p:ph type="body" idx="1"/>
+          </p:nvPr>
+        </p:nvSpPr>
+        <p:spPr/>
+        <p:txBody>
+          <a:bodyPr>
+            <a:normAutofit/>
+          </a:bodyPr>
+          <a:lstStyle/>
+          <a:p>
+            <a:r>
+              <a:rPr lang="en-US" dirty="0" smtClean="0"/>
+              <a:t>All type + examples + GAN</a:t>
+            </a:r>
+          </a:p>
+          <a:p>
+            <a:endParaRPr lang="en-US" dirty="0" smtClean="0"/>
+          </a:p>
+          <a:p>
+            <a:endParaRPr lang="en-US" dirty="0"/>
+          </a:p>
+        </p:txBody>
+      </p:sp>
+      <p:sp>
+        <p:nvSpPr>
+          <p:cNvPr id="4" name="Slide Number Placeholder 3"/>
+          <p:cNvSpPr>
+            <a:spLocks noGrp="1"/>
+          </p:cNvSpPr>
+          <p:nvPr>
+            <p:ph type="sldNum" sz="quarter" idx="10"/>
+          </p:nvPr>
+        </p:nvSpPr>
+        <p:spPr/>
+        <p:txBody>
+          <a:bodyPr/>
+          <a:lstStyle/>
+          <a:p>
+            <a:fld id="{F11CF66E-94DE-4C09-8ACB-78AEC241243A}" type="slidenum">
+              <a:rPr lang="en-US" smtClean="0"/>
+              <a:pPr/>
+              <a:t>6</a:t>
+            </a:fld>
+            <a:endParaRPr lang="en-US"/>
+          </a:p>
+        </p:txBody>
+      </p:sp>
+    </p:spTree>
+  </p:cSld>
+  <p:clrMapOvr>
+    <a:masterClrMapping/>
+  </p:clrMapOvr>
+</p:notes>
+</file>
+
+<file path=ppt/notesSlides/notesSlide4.xml><?xml version="1.0" encoding="utf-8"?>
+<p:notes xmlns:a="http://schemas.openxmlformats.org/drawingml/2006/main" xmlns:r="http://schemas.openxmlformats.org/officeDocument/2006/relationships" xmlns:p="http://schemas.openxmlformats.org/presentationml/2006/main">
+  <p:cSld>
+    <p:spTree>
+      <p:nvGrpSpPr>
+        <p:cNvPr id="1" name=""/>
+        <p:cNvGrpSpPr/>
+        <p:nvPr/>
+      </p:nvGrpSpPr>
+      <p:grpSpPr>
+        <a:xfrm>
+          <a:off x="0" y="0"/>
+          <a:ext cx="0" cy="0"/>
+          <a:chOff x="0" y="0"/>
+          <a:chExt cx="0" cy="0"/>
+        </a:xfrm>
+      </p:grpSpPr>
+      <p:sp>
+        <p:nvSpPr>
+          <p:cNvPr id="2" name="Slide Image Placeholder 1"/>
+          <p:cNvSpPr>
+            <a:spLocks noGrp="1" noRot="1" noChangeAspect="1"/>
+          </p:cNvSpPr>
+          <p:nvPr>
+            <p:ph type="sldImg"/>
+          </p:nvPr>
+        </p:nvSpPr>
+        <p:spPr/>
+      </p:sp>
+      <p:sp>
+        <p:nvSpPr>
+          <p:cNvPr id="3" name="Notes Placeholder 2"/>
+          <p:cNvSpPr>
+            <a:spLocks noGrp="1"/>
+          </p:cNvSpPr>
+          <p:nvPr>
+            <p:ph type="body" idx="1"/>
+          </p:nvPr>
+        </p:nvSpPr>
+        <p:spPr/>
+        <p:txBody>
+          <a:bodyPr>
+            <a:normAutofit/>
+          </a:bodyPr>
+          <a:lstStyle/>
+          <a:p>
+            <a:r>
+              <a:rPr lang="en-US" dirty="0" smtClean="0"/>
+              <a:t>All type + examples + GAN</a:t>
+            </a:r>
+          </a:p>
+          <a:p>
+            <a:endParaRPr lang="en-US" dirty="0" smtClean="0"/>
+          </a:p>
+          <a:p>
+            <a:endParaRPr lang="en-US" dirty="0"/>
+          </a:p>
+        </p:txBody>
+      </p:sp>
+      <p:sp>
+        <p:nvSpPr>
+          <p:cNvPr id="4" name="Slide Number Placeholder 3"/>
+          <p:cNvSpPr>
+            <a:spLocks noGrp="1"/>
+          </p:cNvSpPr>
+          <p:nvPr>
+            <p:ph type="sldNum" sz="quarter" idx="10"/>
+          </p:nvPr>
+        </p:nvSpPr>
+        <p:spPr/>
+        <p:txBody>
+          <a:bodyPr/>
+          <a:lstStyle/>
+          <a:p>
+            <a:fld id="{F11CF66E-94DE-4C09-8ACB-78AEC241243A}" type="slidenum">
+              <a:rPr lang="en-US" smtClean="0"/>
+              <a:pPr/>
+              <a:t>7</a:t>
+            </a:fld>
+            <a:endParaRPr lang="en-US"/>
+          </a:p>
+        </p:txBody>
+      </p:sp>
+    </p:spTree>
+  </p:cSld>
+  <p:clrMapOvr>
+    <a:masterClrMapping/>
+  </p:clrMapOvr>
+</p:notes>
+</file>
+
+<file path=ppt/notesSlides/notesSlide5.xml><?xml version="1.0" encoding="utf-8"?>
+<p:notes xmlns:a="http://schemas.openxmlformats.org/drawingml/2006/main" xmlns:r="http://schemas.openxmlformats.org/officeDocument/2006/relationships" xmlns:p="http://schemas.openxmlformats.org/presentationml/2006/main">
+  <p:cSld>
+    <p:spTree>
+      <p:nvGrpSpPr>
+        <p:cNvPr id="1" name=""/>
+        <p:cNvGrpSpPr/>
+        <p:nvPr/>
+      </p:nvGrpSpPr>
+      <p:grpSpPr>
+        <a:xfrm>
+          <a:off x="0" y="0"/>
+          <a:ext cx="0" cy="0"/>
+          <a:chOff x="0" y="0"/>
+          <a:chExt cx="0" cy="0"/>
+        </a:xfrm>
+      </p:grpSpPr>
+      <p:sp>
+        <p:nvSpPr>
+          <p:cNvPr id="2" name="Slide Image Placeholder 1"/>
+          <p:cNvSpPr>
+            <a:spLocks noGrp="1" noRot="1" noChangeAspect="1"/>
+          </p:cNvSpPr>
+          <p:nvPr>
+            <p:ph type="sldImg"/>
+          </p:nvPr>
+        </p:nvSpPr>
+        <p:spPr/>
+      </p:sp>
+      <p:sp>
+        <p:nvSpPr>
+          <p:cNvPr id="3" name="Notes Placeholder 2"/>
+          <p:cNvSpPr>
+            <a:spLocks noGrp="1"/>
+          </p:cNvSpPr>
+          <p:nvPr>
+            <p:ph type="body" idx="1"/>
+          </p:nvPr>
+        </p:nvSpPr>
+        <p:spPr/>
+        <p:txBody>
+          <a:bodyPr>
+            <a:normAutofit/>
+          </a:bodyPr>
+          <a:lstStyle/>
+          <a:p>
+            <a:r>
+              <a:rPr lang="en-US" dirty="0" smtClean="0"/>
+              <a:t>All type + examples + GAN</a:t>
+            </a:r>
+          </a:p>
+          <a:p>
+            <a:endParaRPr lang="en-US" dirty="0" smtClean="0"/>
+          </a:p>
+          <a:p>
+            <a:endParaRPr lang="en-US" dirty="0"/>
+          </a:p>
+        </p:txBody>
+      </p:sp>
+      <p:sp>
+        <p:nvSpPr>
+          <p:cNvPr id="4" name="Slide Number Placeholder 3"/>
+          <p:cNvSpPr>
+            <a:spLocks noGrp="1"/>
+          </p:cNvSpPr>
+          <p:nvPr>
+            <p:ph type="sldNum" sz="quarter" idx="10"/>
+          </p:nvPr>
+        </p:nvSpPr>
+        <p:spPr/>
+        <p:txBody>
+          <a:bodyPr/>
+          <a:lstStyle/>
+          <a:p>
+            <a:fld id="{F11CF66E-94DE-4C09-8ACB-78AEC241243A}" type="slidenum">
+              <a:rPr lang="en-US" smtClean="0"/>
+              <a:pPr/>
+              <a:t>8</a:t>
+            </a:fld>
+            <a:endParaRPr lang="en-US"/>
+          </a:p>
+        </p:txBody>
+      </p:sp>
+    </p:spTree>
+  </p:cSld>
+  <p:clrMapOvr>
+    <a:masterClrMapping/>
+  </p:clrMapOvr>
+</p:notes>
+</file>
+
 <file path=ppt/slideLayouts/slideLayout1.xml><?xml version="1.0" encoding="utf-8"?>
 <p:sldLayout xmlns:a="http://schemas.openxmlformats.org/drawingml/2006/main" xmlns:r="http://schemas.openxmlformats.org/officeDocument/2006/relationships" xmlns:p="http://schemas.openxmlformats.org/presentationml/2006/main" type="title" preserve="1">
   <p:cSld name="Title Slide">
@@ -643,7 +1109,7 @@
             <a:fld id="{9099FEDA-6AC3-495C-A467-2B0399D71BB7}" type="datetimeFigureOut">
               <a:rPr lang="en-US" smtClean="0"/>
               <a:pPr/>
-              <a:t>12/16/2022</a:t>
+              <a:t>12/28/2022</a:t>
             </a:fld>
             <a:endParaRPr lang="en-US"/>
           </a:p>
@@ -810,7 +1276,7 @@
             <a:fld id="{9099FEDA-6AC3-495C-A467-2B0399D71BB7}" type="datetimeFigureOut">
               <a:rPr lang="en-US" smtClean="0"/>
               <a:pPr/>
-              <a:t>12/16/2022</a:t>
+              <a:t>12/28/2022</a:t>
             </a:fld>
             <a:endParaRPr lang="en-US"/>
           </a:p>
@@ -987,7 +1453,7 @@
             <a:fld id="{9099FEDA-6AC3-495C-A467-2B0399D71BB7}" type="datetimeFigureOut">
               <a:rPr lang="en-US" smtClean="0"/>
               <a:pPr/>
-              <a:t>12/16/2022</a:t>
+              <a:t>12/28/2022</a:t>
             </a:fld>
             <a:endParaRPr lang="en-US"/>
           </a:p>
@@ -1154,7 +1620,7 @@
             <a:fld id="{9099FEDA-6AC3-495C-A467-2B0399D71BB7}" type="datetimeFigureOut">
               <a:rPr lang="en-US" smtClean="0"/>
               <a:pPr/>
-              <a:t>12/16/2022</a:t>
+              <a:t>12/28/2022</a:t>
             </a:fld>
             <a:endParaRPr lang="en-US"/>
           </a:p>
@@ -1397,7 +1863,7 @@
             <a:fld id="{9099FEDA-6AC3-495C-A467-2B0399D71BB7}" type="datetimeFigureOut">
               <a:rPr lang="en-US" smtClean="0"/>
               <a:pPr/>
-              <a:t>12/16/2022</a:t>
+              <a:t>12/28/2022</a:t>
             </a:fld>
             <a:endParaRPr lang="en-US"/>
           </a:p>
@@ -1682,7 +2148,7 @@
             <a:fld id="{9099FEDA-6AC3-495C-A467-2B0399D71BB7}" type="datetimeFigureOut">
               <a:rPr lang="en-US" smtClean="0"/>
               <a:pPr/>
-              <a:t>12/16/2022</a:t>
+              <a:t>12/28/2022</a:t>
             </a:fld>
             <a:endParaRPr lang="en-US"/>
           </a:p>
@@ -2101,7 +2567,7 @@
             <a:fld id="{9099FEDA-6AC3-495C-A467-2B0399D71BB7}" type="datetimeFigureOut">
               <a:rPr lang="en-US" smtClean="0"/>
               <a:pPr/>
-              <a:t>12/16/2022</a:t>
+              <a:t>12/28/2022</a:t>
             </a:fld>
             <a:endParaRPr lang="en-US"/>
           </a:p>
@@ -2216,7 +2682,7 @@
             <a:fld id="{9099FEDA-6AC3-495C-A467-2B0399D71BB7}" type="datetimeFigureOut">
               <a:rPr lang="en-US" smtClean="0"/>
               <a:pPr/>
-              <a:t>12/16/2022</a:t>
+              <a:t>12/28/2022</a:t>
             </a:fld>
             <a:endParaRPr lang="en-US"/>
           </a:p>
@@ -2308,7 +2774,7 @@
             <a:fld id="{9099FEDA-6AC3-495C-A467-2B0399D71BB7}" type="datetimeFigureOut">
               <a:rPr lang="en-US" smtClean="0"/>
               <a:pPr/>
-              <a:t>12/16/2022</a:t>
+              <a:t>12/28/2022</a:t>
             </a:fld>
             <a:endParaRPr lang="en-US"/>
           </a:p>
@@ -2582,7 +3048,7 @@
             <a:fld id="{9099FEDA-6AC3-495C-A467-2B0399D71BB7}" type="datetimeFigureOut">
               <a:rPr lang="en-US" smtClean="0"/>
               <a:pPr/>
-              <a:t>12/16/2022</a:t>
+              <a:t>12/28/2022</a:t>
             </a:fld>
             <a:endParaRPr lang="en-US"/>
           </a:p>
@@ -2832,7 +3298,7 @@
             <a:fld id="{9099FEDA-6AC3-495C-A467-2B0399D71BB7}" type="datetimeFigureOut">
               <a:rPr lang="en-US" smtClean="0"/>
               <a:pPr/>
-              <a:t>12/16/2022</a:t>
+              <a:t>12/28/2022</a:t>
             </a:fld>
             <a:endParaRPr lang="en-US"/>
           </a:p>
@@ -3042,7 +3508,7 @@
             <a:fld id="{9099FEDA-6AC3-495C-A467-2B0399D71BB7}" type="datetimeFigureOut">
               <a:rPr lang="en-US" smtClean="0"/>
               <a:pPr/>
-              <a:t>12/16/2022</a:t>
+              <a:t>12/28/2022</a:t>
             </a:fld>
             <a:endParaRPr lang="en-US"/>
           </a:p>
@@ -3429,7 +3895,7 @@
           <a:lstStyle/>
           <a:p>
             <a:r>
-              <a:rPr lang="en-US" smtClean="0"/>
+              <a:rPr lang="en-US" dirty="0" smtClean="0"/>
               <a:t>K Means Clustering</a:t>
             </a:r>
             <a:endParaRPr lang="en-US" dirty="0"/>
@@ -3465,6 +3931,743 @@
             <a:r>
               <a:rPr lang="en-US" dirty="0" smtClean="0"/>
               <a:t>Bhabha Atomic Research Centre</a:t>
+            </a:r>
+            <a:endParaRPr lang="en-US" dirty="0"/>
+          </a:p>
+        </p:txBody>
+      </p:sp>
+    </p:spTree>
+  </p:cSld>
+  <p:clrMapOvr>
+    <a:masterClrMapping/>
+  </p:clrMapOvr>
+  <p:timing>
+    <p:tnLst>
+      <p:par>
+        <p:cTn id="1" dur="indefinite" restart="never" nodeType="tmRoot"/>
+      </p:par>
+    </p:tnLst>
+  </p:timing>
+</p:sld>
+</file>
+
+<file path=ppt/slides/slide10.xml><?xml version="1.0" encoding="utf-8"?>
+<p:sld xmlns:a="http://schemas.openxmlformats.org/drawingml/2006/main" xmlns:r="http://schemas.openxmlformats.org/officeDocument/2006/relationships" xmlns:p="http://schemas.openxmlformats.org/presentationml/2006/main">
+  <p:cSld>
+    <p:spTree>
+      <p:nvGrpSpPr>
+        <p:cNvPr id="1" name=""/>
+        <p:cNvGrpSpPr/>
+        <p:nvPr/>
+      </p:nvGrpSpPr>
+      <p:grpSpPr>
+        <a:xfrm>
+          <a:off x="0" y="0"/>
+          <a:ext cx="0" cy="0"/>
+          <a:chOff x="0" y="0"/>
+          <a:chExt cx="0" cy="0"/>
+        </a:xfrm>
+      </p:grpSpPr>
+      <p:sp>
+        <p:nvSpPr>
+          <p:cNvPr id="2" name="Title 1"/>
+          <p:cNvSpPr>
+            <a:spLocks noGrp="1"/>
+          </p:cNvSpPr>
+          <p:nvPr>
+            <p:ph type="title"/>
+          </p:nvPr>
+        </p:nvSpPr>
+        <p:spPr/>
+        <p:txBody>
+          <a:bodyPr/>
+          <a:lstStyle/>
+          <a:p>
+            <a:r>
+              <a:rPr lang="en-US" dirty="0" smtClean="0"/>
+              <a:t>Optimization </a:t>
+            </a:r>
+            <a:r>
+              <a:rPr lang="en-US" dirty="0" smtClean="0"/>
+              <a:t>Objective</a:t>
+            </a:r>
+            <a:endParaRPr lang="en-US" dirty="0"/>
+          </a:p>
+        </p:txBody>
+      </p:sp>
+      <p:sp>
+        <p:nvSpPr>
+          <p:cNvPr id="3" name="Content Placeholder 2"/>
+          <p:cNvSpPr>
+            <a:spLocks noGrp="1"/>
+          </p:cNvSpPr>
+          <p:nvPr>
+            <p:ph idx="1"/>
+          </p:nvPr>
+        </p:nvSpPr>
+        <p:spPr/>
+        <p:txBody>
+          <a:bodyPr/>
+          <a:lstStyle/>
+          <a:p>
+            <a:r>
+              <a:rPr lang="en-IN" dirty="0" smtClean="0"/>
+              <a:t>WCSS </a:t>
+            </a:r>
+            <a:r>
+              <a:rPr lang="en-IN" dirty="0" smtClean="0"/>
+              <a:t>– Within Cluster </a:t>
+            </a:r>
+            <a:r>
+              <a:rPr lang="en-IN" dirty="0" smtClean="0"/>
+              <a:t>Sum of </a:t>
+            </a:r>
+            <a:r>
+              <a:rPr lang="en-IN" dirty="0" smtClean="0"/>
+              <a:t>Squares</a:t>
+            </a:r>
+          </a:p>
+          <a:p>
+            <a:r>
+              <a:rPr lang="en-US" dirty="0" smtClean="0"/>
+              <a:t>Variations </a:t>
+            </a:r>
+            <a:r>
+              <a:rPr lang="en-US" dirty="0" smtClean="0"/>
+              <a:t>within </a:t>
+            </a:r>
+            <a:r>
+              <a:rPr lang="en-US" dirty="0" smtClean="0"/>
+              <a:t>a cluster</a:t>
+            </a:r>
+          </a:p>
+          <a:p>
+            <a:endParaRPr lang="en-US" dirty="0" smtClean="0"/>
+          </a:p>
+          <a:p>
+            <a:endParaRPr lang="en-US" dirty="0" smtClean="0"/>
+          </a:p>
+          <a:p>
+            <a:r>
+              <a:rPr lang="en-US" dirty="0" smtClean="0"/>
+              <a:t>Objective – Minimize WCSS</a:t>
+            </a:r>
+          </a:p>
+          <a:p>
+            <a:endParaRPr lang="en-US" dirty="0" smtClean="0"/>
+          </a:p>
+        </p:txBody>
+      </p:sp>
+      <p:graphicFrame>
+        <p:nvGraphicFramePr>
+          <p:cNvPr id="4" name="Object 3"/>
+          <p:cNvGraphicFramePr>
+            <a:graphicFrameLocks noChangeAspect="1"/>
+          </p:cNvGraphicFramePr>
+          <p:nvPr/>
+        </p:nvGraphicFramePr>
+        <p:xfrm>
+          <a:off x="838200" y="2895601"/>
+          <a:ext cx="5066436" cy="990599"/>
+        </p:xfrm>
+        <a:graphic>
+          <a:graphicData uri="http://schemas.openxmlformats.org/presentationml/2006/ole">
+            <p:oleObj spid="_x0000_s1026" name="Equation" r:id="rId3" imgW="2273040" imgH="444240" progId="Equation.3">
+              <p:embed/>
+            </p:oleObj>
+          </a:graphicData>
+        </a:graphic>
+      </p:graphicFrame>
+    </p:spTree>
+  </p:cSld>
+  <p:clrMapOvr>
+    <a:masterClrMapping/>
+  </p:clrMapOvr>
+  <p:timing>
+    <p:tnLst>
+      <p:par>
+        <p:cTn id="1" dur="indefinite" restart="never" nodeType="tmRoot"/>
+      </p:par>
+    </p:tnLst>
+  </p:timing>
+</p:sld>
+</file>
+
+<file path=ppt/slides/slide11.xml><?xml version="1.0" encoding="utf-8"?>
+<p:sld xmlns:a="http://schemas.openxmlformats.org/drawingml/2006/main" xmlns:r="http://schemas.openxmlformats.org/officeDocument/2006/relationships" xmlns:p="http://schemas.openxmlformats.org/presentationml/2006/main">
+  <p:cSld>
+    <p:spTree>
+      <p:nvGrpSpPr>
+        <p:cNvPr id="1" name=""/>
+        <p:cNvGrpSpPr/>
+        <p:nvPr/>
+      </p:nvGrpSpPr>
+      <p:grpSpPr>
+        <a:xfrm>
+          <a:off x="0" y="0"/>
+          <a:ext cx="0" cy="0"/>
+          <a:chOff x="0" y="0"/>
+          <a:chExt cx="0" cy="0"/>
+        </a:xfrm>
+      </p:grpSpPr>
+      <p:sp>
+        <p:nvSpPr>
+          <p:cNvPr id="2" name="Title 1"/>
+          <p:cNvSpPr>
+            <a:spLocks noGrp="1"/>
+          </p:cNvSpPr>
+          <p:nvPr>
+            <p:ph type="title"/>
+          </p:nvPr>
+        </p:nvSpPr>
+        <p:spPr/>
+        <p:txBody>
+          <a:bodyPr/>
+          <a:lstStyle/>
+          <a:p>
+            <a:r>
+              <a:rPr lang="en-US" dirty="0" smtClean="0"/>
+              <a:t>K Means Clustering Algorithm</a:t>
+            </a:r>
+            <a:endParaRPr lang="en-US" dirty="0"/>
+          </a:p>
+        </p:txBody>
+      </p:sp>
+      <p:sp>
+        <p:nvSpPr>
+          <p:cNvPr id="3" name="Content Placeholder 2"/>
+          <p:cNvSpPr>
+            <a:spLocks noGrp="1"/>
+          </p:cNvSpPr>
+          <p:nvPr>
+            <p:ph idx="1"/>
+          </p:nvPr>
+        </p:nvSpPr>
+        <p:spPr/>
+        <p:txBody>
+          <a:bodyPr>
+            <a:normAutofit fontScale="92500" lnSpcReduction="20000"/>
+          </a:bodyPr>
+          <a:lstStyle/>
+          <a:p>
+            <a:pPr marL="514350" indent="-514350">
+              <a:buFont typeface="+mj-lt"/>
+              <a:buAutoNum type="arabicPeriod"/>
+            </a:pPr>
+            <a:r>
+              <a:rPr lang="en-IN" dirty="0" smtClean="0"/>
+              <a:t>Select number of clusters </a:t>
+            </a:r>
+            <a:r>
+              <a:rPr lang="en-IN" dirty="0" smtClean="0"/>
+              <a:t>– K </a:t>
+            </a:r>
+          </a:p>
+          <a:p>
+            <a:pPr marL="514350" indent="-514350">
+              <a:buFont typeface="+mj-lt"/>
+              <a:buAutoNum type="arabicPeriod"/>
+            </a:pPr>
+            <a:r>
+              <a:rPr lang="en-IN" dirty="0" smtClean="0"/>
+              <a:t>Select random K points </a:t>
+            </a:r>
+            <a:r>
+              <a:rPr lang="en-IN" dirty="0" smtClean="0"/>
+              <a:t>as centroids</a:t>
+            </a:r>
+          </a:p>
+          <a:p>
+            <a:pPr marL="514350" indent="-514350">
+              <a:buFont typeface="+mj-lt"/>
+              <a:buAutoNum type="arabicPeriod"/>
+            </a:pPr>
+            <a:r>
+              <a:rPr lang="en-IN" dirty="0" smtClean="0"/>
+              <a:t>Cluster assignment</a:t>
+            </a:r>
+          </a:p>
+          <a:p>
+            <a:pPr marL="971550" lvl="1" indent="-514350"/>
+            <a:r>
+              <a:rPr lang="en-IN" dirty="0" smtClean="0"/>
+              <a:t>Assign each data point to </a:t>
+            </a:r>
+            <a:r>
+              <a:rPr lang="en-IN" dirty="0" smtClean="0"/>
+              <a:t>closest </a:t>
+            </a:r>
+            <a:r>
+              <a:rPr lang="en-IN" dirty="0" smtClean="0"/>
+              <a:t>centroid</a:t>
+            </a:r>
+            <a:endParaRPr lang="en-IN" dirty="0" smtClean="0"/>
+          </a:p>
+          <a:p>
+            <a:pPr marL="514350" indent="-514350">
+              <a:buFont typeface="+mj-lt"/>
+              <a:buAutoNum type="arabicPeriod"/>
+            </a:pPr>
+            <a:r>
+              <a:rPr lang="en-IN" dirty="0" smtClean="0"/>
+              <a:t>Centroid movement</a:t>
+            </a:r>
+          </a:p>
+          <a:p>
+            <a:pPr marL="971550" lvl="1" indent="-514350"/>
+            <a:r>
+              <a:rPr lang="en-IN" dirty="0" smtClean="0"/>
+              <a:t>Compute centroids for new </a:t>
+            </a:r>
+            <a:r>
+              <a:rPr lang="en-IN" dirty="0" smtClean="0"/>
+              <a:t>clusters </a:t>
+            </a:r>
+            <a:endParaRPr lang="en-IN" dirty="0" smtClean="0"/>
+          </a:p>
+          <a:p>
+            <a:pPr marL="514350" indent="-514350">
+              <a:buFont typeface="+mj-lt"/>
+              <a:buAutoNum type="arabicPeriod"/>
+            </a:pPr>
+            <a:r>
+              <a:rPr lang="en-IN" dirty="0" smtClean="0"/>
+              <a:t>Repeat Steps 3 to 5 until </a:t>
+            </a:r>
+          </a:p>
+          <a:p>
+            <a:pPr marL="914400" lvl="1" indent="-514350"/>
+            <a:r>
+              <a:rPr lang="en-US" dirty="0" smtClean="0"/>
+              <a:t>Maximum number of iterations</a:t>
+            </a:r>
+          </a:p>
+          <a:p>
+            <a:pPr marL="914400" lvl="1" indent="-514350"/>
+            <a:r>
+              <a:rPr lang="en-US" dirty="0" smtClean="0"/>
+              <a:t>Minimum </a:t>
+            </a:r>
+            <a:r>
+              <a:rPr lang="en-US" dirty="0" smtClean="0"/>
+              <a:t>variation in cluster centers</a:t>
+            </a:r>
+            <a:endParaRPr lang="en-US" dirty="0" smtClean="0"/>
+          </a:p>
+          <a:p>
+            <a:pPr marL="914400" lvl="1" indent="-514350"/>
+            <a:r>
+              <a:rPr lang="en-US" dirty="0" smtClean="0"/>
+              <a:t>No change </a:t>
+            </a:r>
+            <a:r>
+              <a:rPr lang="en-US" dirty="0" smtClean="0"/>
+              <a:t>in cluster centers</a:t>
+            </a:r>
+            <a:endParaRPr lang="en-US" dirty="0"/>
+          </a:p>
+        </p:txBody>
+      </p:sp>
+    </p:spTree>
+  </p:cSld>
+  <p:clrMapOvr>
+    <a:masterClrMapping/>
+  </p:clrMapOvr>
+  <p:timing>
+    <p:tnLst>
+      <p:par>
+        <p:cTn id="1" dur="indefinite" restart="never" nodeType="tmRoot"/>
+      </p:par>
+    </p:tnLst>
+  </p:timing>
+</p:sld>
+</file>
+
+<file path=ppt/slides/slide12.xml><?xml version="1.0" encoding="utf-8"?>
+<p:sld xmlns:a="http://schemas.openxmlformats.org/drawingml/2006/main" xmlns:r="http://schemas.openxmlformats.org/officeDocument/2006/relationships" xmlns:p="http://schemas.openxmlformats.org/presentationml/2006/main">
+  <p:cSld>
+    <p:spTree>
+      <p:nvGrpSpPr>
+        <p:cNvPr id="1" name=""/>
+        <p:cNvGrpSpPr/>
+        <p:nvPr/>
+      </p:nvGrpSpPr>
+      <p:grpSpPr>
+        <a:xfrm>
+          <a:off x="0" y="0"/>
+          <a:ext cx="0" cy="0"/>
+          <a:chOff x="0" y="0"/>
+          <a:chExt cx="0" cy="0"/>
+        </a:xfrm>
+      </p:grpSpPr>
+      <p:sp>
+        <p:nvSpPr>
+          <p:cNvPr id="2" name="Title 1"/>
+          <p:cNvSpPr>
+            <a:spLocks noGrp="1"/>
+          </p:cNvSpPr>
+          <p:nvPr>
+            <p:ph type="title"/>
+          </p:nvPr>
+        </p:nvSpPr>
+        <p:spPr/>
+        <p:txBody>
+          <a:bodyPr/>
+          <a:lstStyle/>
+          <a:p>
+            <a:r>
+              <a:rPr lang="en-US" dirty="0" smtClean="0"/>
+              <a:t>Random </a:t>
+            </a:r>
+            <a:r>
+              <a:rPr lang="en-US" dirty="0" smtClean="0"/>
+              <a:t>Initialization</a:t>
+            </a:r>
+            <a:endParaRPr lang="en-US" dirty="0"/>
+          </a:p>
+        </p:txBody>
+      </p:sp>
+      <p:sp>
+        <p:nvSpPr>
+          <p:cNvPr id="3" name="Content Placeholder 2"/>
+          <p:cNvSpPr>
+            <a:spLocks noGrp="1"/>
+          </p:cNvSpPr>
+          <p:nvPr>
+            <p:ph idx="1"/>
+          </p:nvPr>
+        </p:nvSpPr>
+        <p:spPr/>
+        <p:txBody>
+          <a:bodyPr>
+            <a:normAutofit/>
+          </a:bodyPr>
+          <a:lstStyle/>
+          <a:p>
+            <a:pPr marL="514350" indent="-514350">
+              <a:buFont typeface="+mj-lt"/>
+              <a:buAutoNum type="arabicPeriod"/>
+            </a:pPr>
+            <a:r>
+              <a:rPr lang="en-IN" dirty="0" smtClean="0"/>
+              <a:t>Select maximum number of iterations</a:t>
+            </a:r>
+          </a:p>
+          <a:p>
+            <a:pPr marL="514350" indent="-514350">
+              <a:buFont typeface="+mj-lt"/>
+              <a:buAutoNum type="arabicPeriod"/>
+            </a:pPr>
+            <a:r>
+              <a:rPr lang="en-US" dirty="0" smtClean="0"/>
+              <a:t>For </a:t>
+            </a:r>
+            <a:r>
+              <a:rPr lang="en-US" dirty="0" smtClean="0"/>
+              <a:t>each </a:t>
+            </a:r>
+            <a:r>
+              <a:rPr lang="en-US" dirty="0" smtClean="0"/>
+              <a:t>iteration</a:t>
+            </a:r>
+            <a:endParaRPr lang="en-US" dirty="0" smtClean="0"/>
+          </a:p>
+          <a:p>
+            <a:pPr marL="914400" lvl="1" indent="-514350"/>
+            <a:r>
+              <a:rPr lang="en-IN" dirty="0" smtClean="0"/>
+              <a:t>Select random K points as centroids</a:t>
+            </a:r>
+            <a:endParaRPr lang="en-US" dirty="0" smtClean="0"/>
+          </a:p>
+          <a:p>
+            <a:pPr marL="914400" lvl="1" indent="-514350"/>
+            <a:r>
+              <a:rPr lang="en-US" dirty="0" smtClean="0"/>
+              <a:t>Compute K clusters </a:t>
+            </a:r>
+          </a:p>
+          <a:p>
+            <a:pPr marL="914400" lvl="1" indent="-514350"/>
+            <a:r>
+              <a:rPr lang="en-US" dirty="0" smtClean="0"/>
+              <a:t>Compute </a:t>
+            </a:r>
+            <a:r>
+              <a:rPr lang="en-US" dirty="0" smtClean="0"/>
+              <a:t>WCSS </a:t>
+            </a:r>
+            <a:r>
+              <a:rPr lang="en-US" dirty="0" smtClean="0"/>
+              <a:t>value</a:t>
+            </a:r>
+          </a:p>
+          <a:p>
+            <a:pPr marL="914400" lvl="1" indent="-514350"/>
+            <a:r>
+              <a:rPr lang="en-US" dirty="0" smtClean="0"/>
+              <a:t>Keep cluster centroids with minimum WCSS</a:t>
+            </a:r>
+          </a:p>
+          <a:p>
+            <a:pPr marL="514350" indent="-514350">
+              <a:buFont typeface="+mj-lt"/>
+              <a:buAutoNum type="arabicPeriod"/>
+            </a:pPr>
+            <a:r>
+              <a:rPr lang="en-US" dirty="0" smtClean="0"/>
+              <a:t>Use cluster centroids with minimum WCSS</a:t>
+            </a:r>
+          </a:p>
+          <a:p>
+            <a:pPr marL="514350" indent="-514350">
+              <a:buFont typeface="+mj-lt"/>
+              <a:buAutoNum type="arabicPeriod"/>
+            </a:pPr>
+            <a:endParaRPr lang="en-IN" dirty="0" smtClean="0"/>
+          </a:p>
+        </p:txBody>
+      </p:sp>
+    </p:spTree>
+  </p:cSld>
+  <p:clrMapOvr>
+    <a:masterClrMapping/>
+  </p:clrMapOvr>
+  <p:timing>
+    <p:tnLst>
+      <p:par>
+        <p:cTn id="1" dur="indefinite" restart="never" nodeType="tmRoot"/>
+      </p:par>
+    </p:tnLst>
+  </p:timing>
+</p:sld>
+</file>
+
+<file path=ppt/slides/slide13.xml><?xml version="1.0" encoding="utf-8"?>
+<p:sld xmlns:a="http://schemas.openxmlformats.org/drawingml/2006/main" xmlns:r="http://schemas.openxmlformats.org/officeDocument/2006/relationships" xmlns:p="http://schemas.openxmlformats.org/presentationml/2006/main">
+  <p:cSld>
+    <p:spTree>
+      <p:nvGrpSpPr>
+        <p:cNvPr id="1" name=""/>
+        <p:cNvGrpSpPr/>
+        <p:nvPr/>
+      </p:nvGrpSpPr>
+      <p:grpSpPr>
+        <a:xfrm>
+          <a:off x="0" y="0"/>
+          <a:ext cx="0" cy="0"/>
+          <a:chOff x="0" y="0"/>
+          <a:chExt cx="0" cy="0"/>
+        </a:xfrm>
+      </p:grpSpPr>
+      <p:sp>
+        <p:nvSpPr>
+          <p:cNvPr id="2" name="Title 1"/>
+          <p:cNvSpPr>
+            <a:spLocks noGrp="1"/>
+          </p:cNvSpPr>
+          <p:nvPr>
+            <p:ph type="title"/>
+          </p:nvPr>
+        </p:nvSpPr>
+        <p:spPr/>
+        <p:txBody>
+          <a:bodyPr/>
+          <a:lstStyle/>
+          <a:p>
+            <a:r>
+              <a:rPr lang="en-US" dirty="0" smtClean="0"/>
+              <a:t>Number </a:t>
+            </a:r>
+            <a:r>
+              <a:rPr lang="en-US" dirty="0" smtClean="0"/>
+              <a:t>O</a:t>
+            </a:r>
+            <a:r>
+              <a:rPr lang="en-US" dirty="0" smtClean="0"/>
+              <a:t>f Clusters</a:t>
+            </a:r>
+            <a:endParaRPr lang="en-US" dirty="0"/>
+          </a:p>
+        </p:txBody>
+      </p:sp>
+      <p:sp>
+        <p:nvSpPr>
+          <p:cNvPr id="3" name="Content Placeholder 2"/>
+          <p:cNvSpPr>
+            <a:spLocks noGrp="1"/>
+          </p:cNvSpPr>
+          <p:nvPr>
+            <p:ph idx="1"/>
+          </p:nvPr>
+        </p:nvSpPr>
+        <p:spPr/>
+        <p:txBody>
+          <a:bodyPr/>
+          <a:lstStyle/>
+          <a:p>
+            <a:pPr marL="514350" indent="-514350">
+              <a:buFont typeface="+mj-lt"/>
+              <a:buAutoNum type="arabicPeriod"/>
+            </a:pPr>
+            <a:r>
+              <a:rPr lang="en-US" dirty="0" smtClean="0"/>
+              <a:t>Select range of values for K</a:t>
+            </a:r>
+          </a:p>
+          <a:p>
+            <a:pPr marL="514350" indent="-514350">
+              <a:buFont typeface="+mj-lt"/>
+              <a:buAutoNum type="arabicPeriod"/>
+            </a:pPr>
+            <a:r>
+              <a:rPr lang="en-US" dirty="0" smtClean="0"/>
+              <a:t>For each value of K</a:t>
+            </a:r>
+          </a:p>
+          <a:p>
+            <a:pPr marL="914400" lvl="1" indent="-514350"/>
+            <a:r>
+              <a:rPr lang="en-US" dirty="0" smtClean="0"/>
+              <a:t>Compute WCSS value</a:t>
+            </a:r>
+          </a:p>
+          <a:p>
+            <a:pPr marL="514350" indent="-514350">
+              <a:buFont typeface="+mj-lt"/>
+              <a:buAutoNum type="arabicPeriod"/>
+            </a:pPr>
+            <a:r>
+              <a:rPr lang="en-IN" dirty="0" smtClean="0"/>
+              <a:t>Plots </a:t>
+            </a:r>
+            <a:r>
+              <a:rPr lang="en-IN" dirty="0" smtClean="0"/>
+              <a:t>curve </a:t>
+            </a:r>
+            <a:r>
+              <a:rPr lang="en-IN" dirty="0" smtClean="0"/>
+              <a:t>between </a:t>
+            </a:r>
+            <a:endParaRPr lang="en-IN" dirty="0" smtClean="0"/>
+          </a:p>
+          <a:p>
+            <a:pPr marL="914400" lvl="1" indent="-514350"/>
+            <a:r>
+              <a:rPr lang="en-IN" dirty="0" smtClean="0"/>
+              <a:t>Calculated </a:t>
+            </a:r>
+            <a:r>
+              <a:rPr lang="en-IN" dirty="0" smtClean="0"/>
+              <a:t>WCSS values </a:t>
+            </a:r>
+            <a:endParaRPr lang="en-IN" dirty="0" smtClean="0"/>
+          </a:p>
+          <a:p>
+            <a:pPr marL="914400" lvl="1" indent="-514350"/>
+            <a:r>
+              <a:rPr lang="en-IN" dirty="0" smtClean="0"/>
+              <a:t>Number </a:t>
+            </a:r>
+            <a:r>
+              <a:rPr lang="en-IN" dirty="0" smtClean="0"/>
+              <a:t>of clusters </a:t>
+            </a:r>
+            <a:r>
+              <a:rPr lang="en-IN" dirty="0" smtClean="0"/>
+              <a:t>K</a:t>
+            </a:r>
+          </a:p>
+          <a:p>
+            <a:pPr marL="514350" indent="-514350">
+              <a:buFont typeface="+mj-lt"/>
+              <a:buAutoNum type="arabicPeriod"/>
+            </a:pPr>
+            <a:r>
+              <a:rPr lang="en-US" dirty="0" smtClean="0"/>
+              <a:t>Best </a:t>
+            </a:r>
+            <a:r>
+              <a:rPr lang="en-US" dirty="0" smtClean="0"/>
+              <a:t>value of K </a:t>
+            </a:r>
+            <a:r>
+              <a:rPr lang="en-US" dirty="0" smtClean="0"/>
+              <a:t>– Sharp reduction in WCSS</a:t>
+            </a:r>
+          </a:p>
+          <a:p>
+            <a:pPr lvl="1"/>
+            <a:endParaRPr lang="en-US" dirty="0"/>
+          </a:p>
+        </p:txBody>
+      </p:sp>
+    </p:spTree>
+  </p:cSld>
+  <p:clrMapOvr>
+    <a:masterClrMapping/>
+  </p:clrMapOvr>
+</p:sld>
+</file>
+
+<file path=ppt/slides/slide14.xml><?xml version="1.0" encoding="utf-8"?>
+<p:sld xmlns:a="http://schemas.openxmlformats.org/drawingml/2006/main" xmlns:r="http://schemas.openxmlformats.org/officeDocument/2006/relationships" xmlns:p="http://schemas.openxmlformats.org/presentationml/2006/main">
+  <p:cSld>
+    <p:spTree>
+      <p:nvGrpSpPr>
+        <p:cNvPr id="1" name=""/>
+        <p:cNvGrpSpPr/>
+        <p:nvPr/>
+      </p:nvGrpSpPr>
+      <p:grpSpPr>
+        <a:xfrm>
+          <a:off x="0" y="0"/>
+          <a:ext cx="0" cy="0"/>
+          <a:chOff x="0" y="0"/>
+          <a:chExt cx="0" cy="0"/>
+        </a:xfrm>
+      </p:grpSpPr>
+      <p:sp>
+        <p:nvSpPr>
+          <p:cNvPr id="2" name="Title 1"/>
+          <p:cNvSpPr>
+            <a:spLocks noGrp="1"/>
+          </p:cNvSpPr>
+          <p:nvPr>
+            <p:ph type="ctrTitle"/>
+          </p:nvPr>
+        </p:nvSpPr>
+        <p:spPr/>
+        <p:txBody>
+          <a:bodyPr/>
+          <a:lstStyle/>
+          <a:p>
+            <a:r>
+              <a:rPr lang="en-US" dirty="0" smtClean="0"/>
+              <a:t>Questions?</a:t>
+            </a:r>
+            <a:endParaRPr lang="en-US" dirty="0"/>
+          </a:p>
+        </p:txBody>
+      </p:sp>
+      <p:sp>
+        <p:nvSpPr>
+          <p:cNvPr id="3" name="Subtitle 2"/>
+          <p:cNvSpPr>
+            <a:spLocks noGrp="1"/>
+          </p:cNvSpPr>
+          <p:nvPr>
+            <p:ph type="subTitle" idx="1"/>
+          </p:nvPr>
+        </p:nvSpPr>
+        <p:spPr/>
+        <p:txBody>
+          <a:bodyPr/>
+          <a:lstStyle/>
+          <a:p>
+            <a:r>
+              <a:rPr lang="en-US" dirty="0" smtClean="0"/>
+              <a:t>Thank you</a:t>
             </a:r>
             <a:endParaRPr lang="en-US" dirty="0"/>
           </a:p>
@@ -3537,10 +4740,54 @@
         </p:nvSpPr>
         <p:spPr/>
         <p:txBody>
-          <a:bodyPr>
-            <a:normAutofit/>
-          </a:bodyPr>
-          <a:lstStyle/>
+          <a:bodyPr/>
+          <a:lstStyle/>
+          <a:p>
+            <a:r>
+              <a:rPr lang="en-US" dirty="0" smtClean="0"/>
+              <a:t>Introduction</a:t>
+            </a:r>
+          </a:p>
+          <a:p>
+            <a:r>
+              <a:rPr lang="en-US" dirty="0" smtClean="0"/>
+              <a:t>K means clustering</a:t>
+            </a:r>
+            <a:endParaRPr lang="en-US" dirty="0" smtClean="0"/>
+          </a:p>
+          <a:p>
+            <a:r>
+              <a:rPr lang="en-US" dirty="0" smtClean="0"/>
+              <a:t>Optimization objective</a:t>
+            </a:r>
+          </a:p>
+          <a:p>
+            <a:r>
+              <a:rPr lang="en-US" dirty="0" smtClean="0"/>
+              <a:t>Random initialization</a:t>
+            </a:r>
+          </a:p>
+          <a:p>
+            <a:r>
+              <a:rPr lang="en-US" dirty="0" smtClean="0"/>
+              <a:t>Number </a:t>
+            </a:r>
+            <a:r>
+              <a:rPr lang="en-US" dirty="0" smtClean="0"/>
+              <a:t>of </a:t>
+            </a:r>
+            <a:r>
+              <a:rPr lang="en-US" dirty="0" smtClean="0"/>
+              <a:t>clusters</a:t>
+            </a:r>
+          </a:p>
+          <a:p>
+            <a:r>
+              <a:rPr lang="en-US" dirty="0" smtClean="0"/>
+              <a:t>Conclusions</a:t>
+            </a:r>
+            <a:endParaRPr lang="en-US" dirty="0" smtClean="0"/>
+          </a:p>
           <a:p>
             <a:endParaRPr lang="en-US" dirty="0"/>
           </a:p>
@@ -3585,17 +4832,21 @@
             <a:spLocks noGrp="1"/>
           </p:cNvSpPr>
           <p:nvPr>
-            <p:ph type="ctrTitle"/>
-          </p:nvPr>
-        </p:nvSpPr>
-        <p:spPr/>
-        <p:txBody>
-          <a:bodyPr/>
-          <a:lstStyle/>
-          <a:p>
-            <a:r>
-              <a:rPr lang="en-US" dirty="0" smtClean="0"/>
-              <a:t>Questions?</a:t>
+            <p:ph type="title"/>
+          </p:nvPr>
+        </p:nvSpPr>
+        <p:spPr/>
+        <p:txBody>
+          <a:bodyPr/>
+          <a:lstStyle/>
+          <a:p>
+            <a:r>
+              <a:rPr lang="en-US" dirty="0" smtClean="0"/>
+              <a:t>Supervised </a:t>
+            </a:r>
+            <a:r>
+              <a:rPr lang="en-US" dirty="0" smtClean="0"/>
+              <a:t>Learning</a:t>
             </a:r>
             <a:endParaRPr lang="en-US" dirty="0"/>
           </a:p>
@@ -3603,22 +4854,1376 @@
       </p:sp>
       <p:sp>
         <p:nvSpPr>
-          <p:cNvPr id="3" name="Subtitle 2"/>
-          <p:cNvSpPr>
-            <a:spLocks noGrp="1"/>
-          </p:cNvSpPr>
-          <p:nvPr>
-            <p:ph type="subTitle" idx="1"/>
-          </p:nvPr>
-        </p:nvSpPr>
-        <p:spPr/>
-        <p:txBody>
-          <a:bodyPr/>
-          <a:lstStyle/>
-          <a:p>
-            <a:r>
-              <a:rPr lang="en-US" dirty="0" smtClean="0"/>
-              <a:t>Thank you</a:t>
+          <p:cNvPr id="4" name="Content Placeholder 3"/>
+          <p:cNvSpPr>
+            <a:spLocks noGrp="1"/>
+          </p:cNvSpPr>
+          <p:nvPr>
+            <p:ph idx="1"/>
+          </p:nvPr>
+        </p:nvSpPr>
+        <p:spPr/>
+        <p:txBody>
+          <a:bodyPr/>
+          <a:lstStyle/>
+          <a:p>
+            <a:r>
+              <a:rPr lang="en-US" dirty="0" smtClean="0"/>
+              <a:t>Training set – { (x</a:t>
+            </a:r>
+            <a:r>
+              <a:rPr lang="en-US" baseline="30000" dirty="0" smtClean="0"/>
+              <a:t>(1)</a:t>
+            </a:r>
+            <a:r>
+              <a:rPr lang="en-US" dirty="0" smtClean="0"/>
+              <a:t>,y</a:t>
+            </a:r>
+            <a:r>
+              <a:rPr lang="en-US" baseline="30000" dirty="0" smtClean="0"/>
+              <a:t>(1)</a:t>
+            </a:r>
+            <a:r>
+              <a:rPr lang="en-US" dirty="0" smtClean="0"/>
+              <a:t>), (x</a:t>
+            </a:r>
+            <a:r>
+              <a:rPr lang="en-US" baseline="30000" dirty="0" smtClean="0"/>
+              <a:t>(2)</a:t>
+            </a:r>
+            <a:r>
+              <a:rPr lang="en-US" dirty="0" smtClean="0"/>
+              <a:t>,y</a:t>
+            </a:r>
+            <a:r>
+              <a:rPr lang="en-US" baseline="30000" dirty="0" smtClean="0"/>
+              <a:t>(2)</a:t>
+            </a:r>
+            <a:r>
+              <a:rPr lang="en-US" dirty="0" smtClean="0"/>
+              <a:t>), …, (x</a:t>
+            </a:r>
+            <a:r>
+              <a:rPr lang="en-US" baseline="30000" dirty="0" smtClean="0"/>
+              <a:t>(m)</a:t>
+            </a:r>
+            <a:r>
+              <a:rPr lang="en-US" dirty="0" smtClean="0"/>
+              <a:t>,y</a:t>
+            </a:r>
+            <a:r>
+              <a:rPr lang="en-US" baseline="30000" dirty="0" smtClean="0"/>
+              <a:t>(m)</a:t>
+            </a:r>
+            <a:r>
+              <a:rPr lang="en-US" dirty="0" smtClean="0"/>
+              <a:t>)}</a:t>
+            </a:r>
+          </a:p>
+          <a:p>
+            <a:r>
+              <a:rPr lang="en-US" dirty="0" smtClean="0"/>
+              <a:t>Labeled </a:t>
+            </a:r>
+            <a:r>
+              <a:rPr lang="en-US" dirty="0" smtClean="0"/>
+              <a:t>dataset</a:t>
+            </a:r>
+            <a:endParaRPr lang="en-US" dirty="0" smtClean="0"/>
+          </a:p>
+          <a:p>
+            <a:endParaRPr lang="en-US" dirty="0"/>
+          </a:p>
+        </p:txBody>
+      </p:sp>
+      <p:pic>
+        <p:nvPicPr>
+          <p:cNvPr id="5" name="Picture 4" descr="SupervisedLearning.png"/>
+          <p:cNvPicPr>
+            <a:picLocks noChangeAspect="1"/>
+          </p:cNvPicPr>
+          <p:nvPr/>
+        </p:nvPicPr>
+        <p:blipFill>
+          <a:blip r:embed="rId2"/>
+          <a:stretch>
+            <a:fillRect/>
+          </a:stretch>
+        </p:blipFill>
+        <p:spPr>
+          <a:xfrm>
+            <a:off x="838200" y="2971800"/>
+            <a:ext cx="7467600" cy="3733800"/>
+          </a:xfrm>
+          <a:prstGeom prst="rect">
+            <a:avLst/>
+          </a:prstGeom>
+        </p:spPr>
+      </p:pic>
+    </p:spTree>
+  </p:cSld>
+  <p:clrMapOvr>
+    <a:masterClrMapping/>
+  </p:clrMapOvr>
+  <p:timing>
+    <p:tnLst>
+      <p:par>
+        <p:cTn id="1" dur="indefinite" restart="never" nodeType="tmRoot"/>
+      </p:par>
+    </p:tnLst>
+  </p:timing>
+</p:sld>
+</file>
+
+<file path=ppt/slides/slide4.xml><?xml version="1.0" encoding="utf-8"?>
+<p:sld xmlns:a="http://schemas.openxmlformats.org/drawingml/2006/main" xmlns:r="http://schemas.openxmlformats.org/officeDocument/2006/relationships" xmlns:p="http://schemas.openxmlformats.org/presentationml/2006/main">
+  <p:cSld>
+    <p:spTree>
+      <p:nvGrpSpPr>
+        <p:cNvPr id="1" name=""/>
+        <p:cNvGrpSpPr/>
+        <p:nvPr/>
+      </p:nvGrpSpPr>
+      <p:grpSpPr>
+        <a:xfrm>
+          <a:off x="0" y="0"/>
+          <a:ext cx="0" cy="0"/>
+          <a:chOff x="0" y="0"/>
+          <a:chExt cx="0" cy="0"/>
+        </a:xfrm>
+      </p:grpSpPr>
+      <p:sp>
+        <p:nvSpPr>
+          <p:cNvPr id="2" name="Title 1"/>
+          <p:cNvSpPr>
+            <a:spLocks noGrp="1"/>
+          </p:cNvSpPr>
+          <p:nvPr>
+            <p:ph type="title"/>
+          </p:nvPr>
+        </p:nvSpPr>
+        <p:spPr/>
+        <p:txBody>
+          <a:bodyPr/>
+          <a:lstStyle/>
+          <a:p>
+            <a:r>
+              <a:rPr lang="en-US" dirty="0" smtClean="0"/>
+              <a:t>Unsupervised </a:t>
+            </a:r>
+            <a:r>
+              <a:rPr lang="en-US" dirty="0" smtClean="0"/>
+              <a:t>Learning </a:t>
+            </a:r>
+            <a:r>
+              <a:rPr lang="en-US" dirty="0" smtClean="0"/>
+              <a:t>– What?</a:t>
+            </a:r>
+            <a:endParaRPr lang="en-US" dirty="0"/>
+          </a:p>
+        </p:txBody>
+      </p:sp>
+      <p:sp>
+        <p:nvSpPr>
+          <p:cNvPr id="3" name="Content Placeholder 2"/>
+          <p:cNvSpPr>
+            <a:spLocks noGrp="1"/>
+          </p:cNvSpPr>
+          <p:nvPr>
+            <p:ph idx="1"/>
+          </p:nvPr>
+        </p:nvSpPr>
+        <p:spPr/>
+        <p:txBody>
+          <a:bodyPr/>
+          <a:lstStyle/>
+          <a:p>
+            <a:r>
+              <a:rPr lang="en-US" dirty="0" smtClean="0"/>
+              <a:t>Training set – { x</a:t>
+            </a:r>
+            <a:r>
+              <a:rPr lang="en-US" baseline="30000" dirty="0" smtClean="0"/>
+              <a:t>(1)</a:t>
+            </a:r>
+            <a:r>
+              <a:rPr lang="en-US" dirty="0" smtClean="0"/>
+              <a:t>, x</a:t>
+            </a:r>
+            <a:r>
+              <a:rPr lang="en-US" baseline="30000" dirty="0" smtClean="0"/>
+              <a:t>(2)</a:t>
+            </a:r>
+            <a:r>
+              <a:rPr lang="en-US" dirty="0" smtClean="0"/>
+              <a:t>, …, x</a:t>
+            </a:r>
+            <a:r>
+              <a:rPr lang="en-US" baseline="30000" dirty="0" smtClean="0"/>
+              <a:t>(m)</a:t>
+            </a:r>
+            <a:r>
+              <a:rPr lang="en-US" dirty="0" smtClean="0"/>
+              <a:t>}</a:t>
+            </a:r>
+          </a:p>
+          <a:p>
+            <a:r>
+              <a:rPr lang="en-US" dirty="0" smtClean="0"/>
+              <a:t>Unlabeled </a:t>
+            </a:r>
+            <a:r>
+              <a:rPr lang="en-US" dirty="0" smtClean="0"/>
+              <a:t>dataset</a:t>
+            </a:r>
+            <a:endParaRPr lang="en-US" dirty="0"/>
+          </a:p>
+        </p:txBody>
+      </p:sp>
+      <p:pic>
+        <p:nvPicPr>
+          <p:cNvPr id="7" name="Picture 6" descr="unclustered_data.jpg"/>
+          <p:cNvPicPr>
+            <a:picLocks noChangeAspect="1"/>
+          </p:cNvPicPr>
+          <p:nvPr/>
+        </p:nvPicPr>
+        <p:blipFill>
+          <a:blip r:embed="rId3" cstate="print"/>
+          <a:stretch>
+            <a:fillRect/>
+          </a:stretch>
+        </p:blipFill>
+        <p:spPr>
+          <a:xfrm>
+            <a:off x="1066800" y="3962400"/>
+            <a:ext cx="3163542" cy="2642616"/>
+          </a:xfrm>
+          <a:prstGeom prst="rect">
+            <a:avLst/>
+          </a:prstGeom>
+        </p:spPr>
+      </p:pic>
+    </p:spTree>
+  </p:cSld>
+  <p:clrMapOvr>
+    <a:masterClrMapping/>
+  </p:clrMapOvr>
+  <p:timing>
+    <p:tnLst>
+      <p:par>
+        <p:cTn id="1" dur="indefinite" restart="never" nodeType="tmRoot"/>
+      </p:par>
+    </p:tnLst>
+  </p:timing>
+</p:sld>
+</file>
+
+<file path=ppt/slides/slide5.xml><?xml version="1.0" encoding="utf-8"?>
+<p:sld xmlns:a="http://schemas.openxmlformats.org/drawingml/2006/main" xmlns:r="http://schemas.openxmlformats.org/officeDocument/2006/relationships" xmlns:p="http://schemas.openxmlformats.org/presentationml/2006/main">
+  <p:cSld>
+    <p:spTree>
+      <p:nvGrpSpPr>
+        <p:cNvPr id="1" name=""/>
+        <p:cNvGrpSpPr/>
+        <p:nvPr/>
+      </p:nvGrpSpPr>
+      <p:grpSpPr>
+        <a:xfrm>
+          <a:off x="0" y="0"/>
+          <a:ext cx="0" cy="0"/>
+          <a:chOff x="0" y="0"/>
+          <a:chExt cx="0" cy="0"/>
+        </a:xfrm>
+      </p:grpSpPr>
+      <p:sp>
+        <p:nvSpPr>
+          <p:cNvPr id="2" name="Title 1"/>
+          <p:cNvSpPr>
+            <a:spLocks noGrp="1"/>
+          </p:cNvSpPr>
+          <p:nvPr>
+            <p:ph type="title"/>
+          </p:nvPr>
+        </p:nvSpPr>
+        <p:spPr/>
+        <p:txBody>
+          <a:bodyPr/>
+          <a:lstStyle/>
+          <a:p>
+            <a:r>
+              <a:rPr lang="en-US" dirty="0" smtClean="0"/>
+              <a:t>Unsupervised </a:t>
+            </a:r>
+            <a:r>
+              <a:rPr lang="en-US" dirty="0" smtClean="0"/>
+              <a:t>Learning </a:t>
+            </a:r>
+            <a:r>
+              <a:rPr lang="en-US" dirty="0" smtClean="0"/>
+              <a:t>– How?</a:t>
+            </a:r>
+            <a:endParaRPr lang="en-US" dirty="0"/>
+          </a:p>
+        </p:txBody>
+      </p:sp>
+      <p:sp>
+        <p:nvSpPr>
+          <p:cNvPr id="3" name="Content Placeholder 2"/>
+          <p:cNvSpPr>
+            <a:spLocks noGrp="1"/>
+          </p:cNvSpPr>
+          <p:nvPr>
+            <p:ph idx="1"/>
+          </p:nvPr>
+        </p:nvSpPr>
+        <p:spPr/>
+        <p:txBody>
+          <a:bodyPr/>
+          <a:lstStyle/>
+          <a:p>
+            <a:r>
+              <a:rPr lang="en-US" dirty="0" smtClean="0"/>
+              <a:t>Find structure </a:t>
+            </a:r>
+            <a:r>
+              <a:rPr lang="en-US" dirty="0" smtClean="0"/>
+              <a:t>of data</a:t>
+            </a:r>
+            <a:endParaRPr lang="en-US" dirty="0" smtClean="0"/>
+          </a:p>
+          <a:p>
+            <a:r>
+              <a:rPr lang="en-US" dirty="0" smtClean="0"/>
+              <a:t>Group or cluster data</a:t>
+            </a:r>
+          </a:p>
+          <a:p>
+            <a:r>
+              <a:rPr lang="en-US" dirty="0" smtClean="0"/>
+              <a:t>Extract useful information about data</a:t>
+            </a:r>
+          </a:p>
+          <a:p>
+            <a:endParaRPr lang="en-US" dirty="0"/>
+          </a:p>
+        </p:txBody>
+      </p:sp>
+      <p:pic>
+        <p:nvPicPr>
+          <p:cNvPr id="5" name="Picture 4" descr="UnsupervisedLearning.jpg"/>
+          <p:cNvPicPr>
+            <a:picLocks noChangeAspect="1"/>
+          </p:cNvPicPr>
+          <p:nvPr/>
+        </p:nvPicPr>
+        <p:blipFill>
+          <a:blip r:embed="rId3" cstate="print"/>
+          <a:stretch>
+            <a:fillRect/>
+          </a:stretch>
+        </p:blipFill>
+        <p:spPr>
+          <a:xfrm>
+            <a:off x="990600" y="3962400"/>
+            <a:ext cx="6858000" cy="2641238"/>
+          </a:xfrm>
+          <a:prstGeom prst="rect">
+            <a:avLst/>
+          </a:prstGeom>
+        </p:spPr>
+      </p:pic>
+      <p:sp>
+        <p:nvSpPr>
+          <p:cNvPr id="6" name="Text Box 10"/>
+          <p:cNvSpPr txBox="1">
+            <a:spLocks noChangeArrowheads="1"/>
+          </p:cNvSpPr>
+          <p:nvPr/>
+        </p:nvSpPr>
+        <p:spPr bwMode="auto">
+          <a:xfrm rot="10800000" flipV="1">
+            <a:off x="0" y="6519446"/>
+            <a:ext cx="1828800" cy="338554"/>
+          </a:xfrm>
+          <a:prstGeom prst="rect">
+            <a:avLst/>
+          </a:prstGeom>
+          <a:noFill/>
+          <a:ln w="9525">
+            <a:noFill/>
+            <a:miter lim="800000"/>
+            <a:headEnd/>
+            <a:tailEnd/>
+          </a:ln>
+          <a:effectLst/>
+        </p:spPr>
+        <p:txBody>
+          <a:bodyPr wrap="square">
+            <a:spAutoFit/>
+          </a:bodyPr>
+          <a:lstStyle/>
+          <a:p>
+            <a:pPr>
+              <a:spcBef>
+                <a:spcPct val="50000"/>
+              </a:spcBef>
+            </a:pPr>
+            <a:r>
+              <a:rPr lang="en-US" sz="1600" b="1" dirty="0">
+                <a:solidFill>
+                  <a:srgbClr val="FF0000"/>
+                </a:solidFill>
+              </a:rPr>
+              <a:t>Image </a:t>
+            </a:r>
+            <a:r>
+              <a:rPr lang="en-US" sz="1600" b="1" dirty="0" err="1" smtClean="0">
+                <a:solidFill>
+                  <a:srgbClr val="FF0000"/>
+                </a:solidFill>
+              </a:rPr>
+              <a:t>ack</a:t>
+            </a:r>
+            <a:r>
+              <a:rPr lang="en-US" sz="1600" b="1" dirty="0" smtClean="0">
+                <a:solidFill>
+                  <a:srgbClr val="FF0000"/>
+                </a:solidFill>
+              </a:rPr>
+              <a:t> – Google</a:t>
+            </a:r>
+            <a:endParaRPr lang="en-US" sz="1600" b="1" dirty="0">
+              <a:solidFill>
+                <a:srgbClr val="FF0000"/>
+              </a:solidFill>
+            </a:endParaRPr>
+          </a:p>
+        </p:txBody>
+      </p:sp>
+    </p:spTree>
+  </p:cSld>
+  <p:clrMapOvr>
+    <a:masterClrMapping/>
+  </p:clrMapOvr>
+  <p:timing>
+    <p:tnLst>
+      <p:par>
+        <p:cTn id="1" dur="indefinite" restart="never" nodeType="tmRoot"/>
+      </p:par>
+    </p:tnLst>
+  </p:timing>
+</p:sld>
+</file>
+
+<file path=ppt/slides/slide6.xml><?xml version="1.0" encoding="utf-8"?>
+<p:sld xmlns:a="http://schemas.openxmlformats.org/drawingml/2006/main" xmlns:r="http://schemas.openxmlformats.org/officeDocument/2006/relationships" xmlns:p="http://schemas.openxmlformats.org/presentationml/2006/main">
+  <p:cSld>
+    <p:spTree>
+      <p:nvGrpSpPr>
+        <p:cNvPr id="1" name=""/>
+        <p:cNvGrpSpPr/>
+        <p:nvPr/>
+      </p:nvGrpSpPr>
+      <p:grpSpPr>
+        <a:xfrm>
+          <a:off x="0" y="0"/>
+          <a:ext cx="0" cy="0"/>
+          <a:chOff x="0" y="0"/>
+          <a:chExt cx="0" cy="0"/>
+        </a:xfrm>
+      </p:grpSpPr>
+      <p:sp>
+        <p:nvSpPr>
+          <p:cNvPr id="2" name="Title 1"/>
+          <p:cNvSpPr>
+            <a:spLocks noGrp="1"/>
+          </p:cNvSpPr>
+          <p:nvPr>
+            <p:ph type="title"/>
+          </p:nvPr>
+        </p:nvSpPr>
+        <p:spPr/>
+        <p:txBody>
+          <a:bodyPr/>
+          <a:lstStyle/>
+          <a:p>
+            <a:r>
+              <a:rPr lang="en-US" dirty="0" smtClean="0"/>
+              <a:t>Applications</a:t>
+            </a:r>
+            <a:endParaRPr lang="en-US" dirty="0"/>
+          </a:p>
+        </p:txBody>
+      </p:sp>
+      <p:grpSp>
+        <p:nvGrpSpPr>
+          <p:cNvPr id="16" name="Group 15"/>
+          <p:cNvGrpSpPr/>
+          <p:nvPr/>
+        </p:nvGrpSpPr>
+        <p:grpSpPr>
+          <a:xfrm>
+            <a:off x="762000" y="1333500"/>
+            <a:ext cx="2895600" cy="2541032"/>
+            <a:chOff x="762000" y="1333500"/>
+            <a:chExt cx="2895600" cy="2541032"/>
+          </a:xfrm>
+        </p:grpSpPr>
+        <p:pic>
+          <p:nvPicPr>
+            <p:cNvPr id="3" name="Picture 2" descr="market_segmentation.jpg"/>
+            <p:cNvPicPr>
+              <a:picLocks noChangeAspect="1"/>
+            </p:cNvPicPr>
+            <p:nvPr/>
+          </p:nvPicPr>
+          <p:blipFill>
+            <a:blip r:embed="rId3"/>
+            <a:stretch>
+              <a:fillRect/>
+            </a:stretch>
+          </p:blipFill>
+          <p:spPr>
+            <a:xfrm>
+              <a:off x="762000" y="1333500"/>
+              <a:ext cx="2895600" cy="2171700"/>
+            </a:xfrm>
+            <a:prstGeom prst="rect">
+              <a:avLst/>
+            </a:prstGeom>
+          </p:spPr>
+        </p:pic>
+        <p:sp>
+          <p:nvSpPr>
+            <p:cNvPr id="4" name="TextBox 3"/>
+            <p:cNvSpPr txBox="1"/>
+            <p:nvPr/>
+          </p:nvSpPr>
+          <p:spPr>
+            <a:xfrm>
+              <a:off x="762000" y="3505200"/>
+              <a:ext cx="2895600" cy="369332"/>
+            </a:xfrm>
+            <a:prstGeom prst="rect">
+              <a:avLst/>
+            </a:prstGeom>
+            <a:noFill/>
+          </p:spPr>
+          <p:txBody>
+            <a:bodyPr wrap="square" rtlCol="0">
+              <a:spAutoFit/>
+            </a:bodyPr>
+            <a:lstStyle/>
+            <a:p>
+              <a:pPr algn="ctr"/>
+              <a:r>
+                <a:rPr lang="en-US" b="1" dirty="0" smtClean="0"/>
+                <a:t>Market segmentation</a:t>
+              </a:r>
+              <a:endParaRPr lang="en-US" b="1" dirty="0"/>
+            </a:p>
+          </p:txBody>
+        </p:sp>
+      </p:grpSp>
+      <p:grpSp>
+        <p:nvGrpSpPr>
+          <p:cNvPr id="18" name="Group 17"/>
+          <p:cNvGrpSpPr/>
+          <p:nvPr/>
+        </p:nvGrpSpPr>
+        <p:grpSpPr>
+          <a:xfrm>
+            <a:off x="5486400" y="1447800"/>
+            <a:ext cx="2667000" cy="2350532"/>
+            <a:chOff x="5486400" y="1447800"/>
+            <a:chExt cx="2667000" cy="2350532"/>
+          </a:xfrm>
+        </p:grpSpPr>
+        <p:pic>
+          <p:nvPicPr>
+            <p:cNvPr id="5" name="Picture 4" descr="SocialNetworkAnalysis.jpg"/>
+            <p:cNvPicPr>
+              <a:picLocks noChangeAspect="1"/>
+            </p:cNvPicPr>
+            <p:nvPr/>
+          </p:nvPicPr>
+          <p:blipFill>
+            <a:blip r:embed="rId4"/>
+            <a:stretch>
+              <a:fillRect/>
+            </a:stretch>
+          </p:blipFill>
+          <p:spPr>
+            <a:xfrm>
+              <a:off x="5486400" y="1447800"/>
+              <a:ext cx="2667000" cy="2000250"/>
+            </a:xfrm>
+            <a:prstGeom prst="rect">
+              <a:avLst/>
+            </a:prstGeom>
+          </p:spPr>
+        </p:pic>
+        <p:sp>
+          <p:nvSpPr>
+            <p:cNvPr id="6" name="TextBox 5"/>
+            <p:cNvSpPr txBox="1"/>
+            <p:nvPr/>
+          </p:nvSpPr>
+          <p:spPr>
+            <a:xfrm>
+              <a:off x="5486400" y="3429000"/>
+              <a:ext cx="2667000" cy="369332"/>
+            </a:xfrm>
+            <a:prstGeom prst="rect">
+              <a:avLst/>
+            </a:prstGeom>
+            <a:noFill/>
+          </p:spPr>
+          <p:txBody>
+            <a:bodyPr wrap="square" rtlCol="0">
+              <a:spAutoFit/>
+            </a:bodyPr>
+            <a:lstStyle/>
+            <a:p>
+              <a:pPr algn="ctr"/>
+              <a:r>
+                <a:rPr lang="en-US" b="1" dirty="0" smtClean="0"/>
+                <a:t>Social network analysis</a:t>
+              </a:r>
+              <a:endParaRPr lang="en-US" b="1" dirty="0"/>
+            </a:p>
+          </p:txBody>
+        </p:sp>
+      </p:grpSp>
+      <p:grpSp>
+        <p:nvGrpSpPr>
+          <p:cNvPr id="17" name="Group 16"/>
+          <p:cNvGrpSpPr/>
+          <p:nvPr/>
+        </p:nvGrpSpPr>
+        <p:grpSpPr>
+          <a:xfrm>
+            <a:off x="685800" y="4038600"/>
+            <a:ext cx="3200400" cy="2350532"/>
+            <a:chOff x="685800" y="4038600"/>
+            <a:chExt cx="3200400" cy="2350532"/>
+          </a:xfrm>
+        </p:grpSpPr>
+        <p:pic>
+          <p:nvPicPr>
+            <p:cNvPr id="7" name="Picture 6" descr="OrganizeComputingClusters.jpg"/>
+            <p:cNvPicPr>
+              <a:picLocks noChangeAspect="1"/>
+            </p:cNvPicPr>
+            <p:nvPr/>
+          </p:nvPicPr>
+          <p:blipFill>
+            <a:blip r:embed="rId5" cstate="print"/>
+            <a:stretch>
+              <a:fillRect/>
+            </a:stretch>
+          </p:blipFill>
+          <p:spPr>
+            <a:xfrm>
+              <a:off x="1041374" y="4038600"/>
+              <a:ext cx="2612696" cy="1959775"/>
+            </a:xfrm>
+            <a:prstGeom prst="rect">
+              <a:avLst/>
+            </a:prstGeom>
+          </p:spPr>
+        </p:pic>
+        <p:sp>
+          <p:nvSpPr>
+            <p:cNvPr id="8" name="TextBox 7"/>
+            <p:cNvSpPr txBox="1"/>
+            <p:nvPr/>
+          </p:nvSpPr>
+          <p:spPr>
+            <a:xfrm>
+              <a:off x="685800" y="6019800"/>
+              <a:ext cx="3200400" cy="369332"/>
+            </a:xfrm>
+            <a:prstGeom prst="rect">
+              <a:avLst/>
+            </a:prstGeom>
+            <a:noFill/>
+          </p:spPr>
+          <p:txBody>
+            <a:bodyPr wrap="square" rtlCol="0">
+              <a:spAutoFit/>
+            </a:bodyPr>
+            <a:lstStyle/>
+            <a:p>
+              <a:pPr algn="ctr"/>
+              <a:r>
+                <a:rPr lang="en-US" b="1" dirty="0" smtClean="0"/>
+                <a:t>Computing cluster organization</a:t>
+              </a:r>
+              <a:endParaRPr lang="en-US" b="1" dirty="0"/>
+            </a:p>
+          </p:txBody>
+        </p:sp>
+      </p:grpSp>
+      <p:grpSp>
+        <p:nvGrpSpPr>
+          <p:cNvPr id="19" name="Group 18"/>
+          <p:cNvGrpSpPr/>
+          <p:nvPr/>
+        </p:nvGrpSpPr>
+        <p:grpSpPr>
+          <a:xfrm>
+            <a:off x="5486400" y="4036696"/>
+            <a:ext cx="2895600" cy="2352436"/>
+            <a:chOff x="5486400" y="4036696"/>
+            <a:chExt cx="2895600" cy="2352436"/>
+          </a:xfrm>
+        </p:grpSpPr>
+        <p:pic>
+          <p:nvPicPr>
+            <p:cNvPr id="11" name="Picture 10" descr="AstronomicalDataAnalysis.jpg"/>
+            <p:cNvPicPr>
+              <a:picLocks noChangeAspect="1"/>
+            </p:cNvPicPr>
+            <p:nvPr/>
+          </p:nvPicPr>
+          <p:blipFill>
+            <a:blip r:embed="rId6" cstate="print"/>
+            <a:stretch>
+              <a:fillRect/>
+            </a:stretch>
+          </p:blipFill>
+          <p:spPr>
+            <a:xfrm>
+              <a:off x="5638800" y="4036696"/>
+              <a:ext cx="2612786" cy="1983104"/>
+            </a:xfrm>
+            <a:prstGeom prst="rect">
+              <a:avLst/>
+            </a:prstGeom>
+          </p:spPr>
+        </p:pic>
+        <p:sp>
+          <p:nvSpPr>
+            <p:cNvPr id="12" name="TextBox 11"/>
+            <p:cNvSpPr txBox="1"/>
+            <p:nvPr/>
+          </p:nvSpPr>
+          <p:spPr>
+            <a:xfrm>
+              <a:off x="5486400" y="6019800"/>
+              <a:ext cx="2895600" cy="369332"/>
+            </a:xfrm>
+            <a:prstGeom prst="rect">
+              <a:avLst/>
+            </a:prstGeom>
+            <a:noFill/>
+          </p:spPr>
+          <p:txBody>
+            <a:bodyPr wrap="square" rtlCol="0">
+              <a:spAutoFit/>
+            </a:bodyPr>
+            <a:lstStyle/>
+            <a:p>
+              <a:pPr algn="ctr"/>
+              <a:r>
+                <a:rPr lang="en-US" b="1" dirty="0" smtClean="0"/>
+                <a:t>Astronomical data analysis</a:t>
+              </a:r>
+              <a:endParaRPr lang="en-US" b="1" dirty="0"/>
+            </a:p>
+          </p:txBody>
+        </p:sp>
+      </p:grpSp>
+      <p:sp>
+        <p:nvSpPr>
+          <p:cNvPr id="20" name="Text Box 10"/>
+          <p:cNvSpPr txBox="1">
+            <a:spLocks noChangeArrowheads="1"/>
+          </p:cNvSpPr>
+          <p:nvPr/>
+        </p:nvSpPr>
+        <p:spPr bwMode="auto">
+          <a:xfrm rot="10800000" flipV="1">
+            <a:off x="0" y="6519446"/>
+            <a:ext cx="1828800" cy="338554"/>
+          </a:xfrm>
+          <a:prstGeom prst="rect">
+            <a:avLst/>
+          </a:prstGeom>
+          <a:noFill/>
+          <a:ln w="9525">
+            <a:noFill/>
+            <a:miter lim="800000"/>
+            <a:headEnd/>
+            <a:tailEnd/>
+          </a:ln>
+          <a:effectLst/>
+        </p:spPr>
+        <p:txBody>
+          <a:bodyPr wrap="square">
+            <a:spAutoFit/>
+          </a:bodyPr>
+          <a:lstStyle/>
+          <a:p>
+            <a:pPr>
+              <a:spcBef>
+                <a:spcPct val="50000"/>
+              </a:spcBef>
+            </a:pPr>
+            <a:r>
+              <a:rPr lang="en-US" sz="1600" b="1" dirty="0">
+                <a:solidFill>
+                  <a:srgbClr val="FF0000"/>
+                </a:solidFill>
+              </a:rPr>
+              <a:t>Image </a:t>
+            </a:r>
+            <a:r>
+              <a:rPr lang="en-US" sz="1600" b="1" dirty="0" err="1" smtClean="0">
+                <a:solidFill>
+                  <a:srgbClr val="FF0000"/>
+                </a:solidFill>
+              </a:rPr>
+              <a:t>ack</a:t>
+            </a:r>
+            <a:r>
+              <a:rPr lang="en-US" sz="1600" b="1" dirty="0" smtClean="0">
+                <a:solidFill>
+                  <a:srgbClr val="FF0000"/>
+                </a:solidFill>
+              </a:rPr>
+              <a:t> – Google</a:t>
+            </a:r>
+            <a:endParaRPr lang="en-US" sz="1600" b="1" dirty="0">
+              <a:solidFill>
+                <a:srgbClr val="FF0000"/>
+              </a:solidFill>
+            </a:endParaRPr>
+          </a:p>
+        </p:txBody>
+      </p:sp>
+    </p:spTree>
+  </p:cSld>
+  <p:clrMapOvr>
+    <a:masterClrMapping/>
+  </p:clrMapOvr>
+  <p:timing>
+    <p:tnLst>
+      <p:par>
+        <p:cTn id="1" dur="indefinite" restart="never" nodeType="tmRoot"/>
+      </p:par>
+    </p:tnLst>
+  </p:timing>
+</p:sld>
+</file>
+
+<file path=ppt/slides/slide7.xml><?xml version="1.0" encoding="utf-8"?>
+<p:sld xmlns:a="http://schemas.openxmlformats.org/drawingml/2006/main" xmlns:r="http://schemas.openxmlformats.org/officeDocument/2006/relationships" xmlns:p="http://schemas.openxmlformats.org/presentationml/2006/main">
+  <p:cSld>
+    <p:spTree>
+      <p:nvGrpSpPr>
+        <p:cNvPr id="1" name=""/>
+        <p:cNvGrpSpPr/>
+        <p:nvPr/>
+      </p:nvGrpSpPr>
+      <p:grpSpPr>
+        <a:xfrm>
+          <a:off x="0" y="0"/>
+          <a:ext cx="0" cy="0"/>
+          <a:chOff x="0" y="0"/>
+          <a:chExt cx="0" cy="0"/>
+        </a:xfrm>
+      </p:grpSpPr>
+      <p:sp>
+        <p:nvSpPr>
+          <p:cNvPr id="2" name="Title 1"/>
+          <p:cNvSpPr>
+            <a:spLocks noGrp="1"/>
+          </p:cNvSpPr>
+          <p:nvPr>
+            <p:ph type="title"/>
+          </p:nvPr>
+        </p:nvSpPr>
+        <p:spPr/>
+        <p:txBody>
+          <a:bodyPr/>
+          <a:lstStyle/>
+          <a:p>
+            <a:r>
+              <a:rPr lang="en-US" dirty="0" smtClean="0"/>
+              <a:t>Clustering – Market </a:t>
+            </a:r>
+            <a:r>
+              <a:rPr lang="en-US" dirty="0" smtClean="0"/>
+              <a:t>Segmentation</a:t>
+            </a:r>
+            <a:endParaRPr lang="en-US" dirty="0"/>
+          </a:p>
+        </p:txBody>
+      </p:sp>
+      <p:sp>
+        <p:nvSpPr>
+          <p:cNvPr id="3" name="Content Placeholder 2"/>
+          <p:cNvSpPr>
+            <a:spLocks noGrp="1"/>
+          </p:cNvSpPr>
+          <p:nvPr>
+            <p:ph idx="1"/>
+          </p:nvPr>
+        </p:nvSpPr>
+        <p:spPr/>
+        <p:txBody>
+          <a:bodyPr/>
+          <a:lstStyle/>
+          <a:p>
+            <a:r>
+              <a:rPr lang="en-US" dirty="0" smtClean="0"/>
+              <a:t>Customer database</a:t>
+            </a:r>
+          </a:p>
+          <a:p>
+            <a:r>
+              <a:rPr lang="en-US" dirty="0" smtClean="0"/>
+              <a:t>Group into market segments</a:t>
+            </a:r>
+          </a:p>
+          <a:p>
+            <a:r>
+              <a:rPr lang="en-US" dirty="0" smtClean="0"/>
+              <a:t>Serve market segments differently  </a:t>
+            </a:r>
+            <a:endParaRPr lang="en-US" dirty="0"/>
+          </a:p>
+        </p:txBody>
+      </p:sp>
+      <p:pic>
+        <p:nvPicPr>
+          <p:cNvPr id="5" name="Picture 4" descr="market_segmentation.jpg"/>
+          <p:cNvPicPr>
+            <a:picLocks noChangeAspect="1"/>
+          </p:cNvPicPr>
+          <p:nvPr/>
+        </p:nvPicPr>
+        <p:blipFill>
+          <a:blip r:embed="rId3"/>
+          <a:stretch>
+            <a:fillRect/>
+          </a:stretch>
+        </p:blipFill>
+        <p:spPr>
+          <a:xfrm>
+            <a:off x="5105400" y="3810000"/>
+            <a:ext cx="3810000" cy="2857500"/>
+          </a:xfrm>
+          <a:prstGeom prst="rect">
+            <a:avLst/>
+          </a:prstGeom>
+        </p:spPr>
+      </p:pic>
+      <p:sp>
+        <p:nvSpPr>
+          <p:cNvPr id="6" name="Text Box 10"/>
+          <p:cNvSpPr txBox="1">
+            <a:spLocks noChangeArrowheads="1"/>
+          </p:cNvSpPr>
+          <p:nvPr/>
+        </p:nvSpPr>
+        <p:spPr bwMode="auto">
+          <a:xfrm rot="10800000" flipV="1">
+            <a:off x="0" y="6519446"/>
+            <a:ext cx="1828800" cy="338554"/>
+          </a:xfrm>
+          <a:prstGeom prst="rect">
+            <a:avLst/>
+          </a:prstGeom>
+          <a:noFill/>
+          <a:ln w="9525">
+            <a:noFill/>
+            <a:miter lim="800000"/>
+            <a:headEnd/>
+            <a:tailEnd/>
+          </a:ln>
+          <a:effectLst/>
+        </p:spPr>
+        <p:txBody>
+          <a:bodyPr wrap="square">
+            <a:spAutoFit/>
+          </a:bodyPr>
+          <a:lstStyle/>
+          <a:p>
+            <a:pPr>
+              <a:spcBef>
+                <a:spcPct val="50000"/>
+              </a:spcBef>
+            </a:pPr>
+            <a:r>
+              <a:rPr lang="en-US" sz="1600" b="1" dirty="0">
+                <a:solidFill>
+                  <a:srgbClr val="FF0000"/>
+                </a:solidFill>
+              </a:rPr>
+              <a:t>Image </a:t>
+            </a:r>
+            <a:r>
+              <a:rPr lang="en-US" sz="1600" b="1" dirty="0" err="1" smtClean="0">
+                <a:solidFill>
+                  <a:srgbClr val="FF0000"/>
+                </a:solidFill>
+              </a:rPr>
+              <a:t>ack</a:t>
+            </a:r>
+            <a:r>
+              <a:rPr lang="en-US" sz="1600" b="1" dirty="0" smtClean="0">
+                <a:solidFill>
+                  <a:srgbClr val="FF0000"/>
+                </a:solidFill>
+              </a:rPr>
+              <a:t> – Google</a:t>
+            </a:r>
+            <a:endParaRPr lang="en-US" sz="1600" b="1" dirty="0">
+              <a:solidFill>
+                <a:srgbClr val="FF0000"/>
+              </a:solidFill>
+            </a:endParaRPr>
+          </a:p>
+        </p:txBody>
+      </p:sp>
+    </p:spTree>
+  </p:cSld>
+  <p:clrMapOvr>
+    <a:masterClrMapping/>
+  </p:clrMapOvr>
+  <p:timing>
+    <p:tnLst>
+      <p:par>
+        <p:cTn id="1" dur="indefinite" restart="never" nodeType="tmRoot"/>
+      </p:par>
+    </p:tnLst>
+  </p:timing>
+</p:sld>
+</file>
+
+<file path=ppt/slides/slide8.xml><?xml version="1.0" encoding="utf-8"?>
+<p:sld xmlns:a="http://schemas.openxmlformats.org/drawingml/2006/main" xmlns:r="http://schemas.openxmlformats.org/officeDocument/2006/relationships" xmlns:p="http://schemas.openxmlformats.org/presentationml/2006/main">
+  <p:cSld>
+    <p:spTree>
+      <p:nvGrpSpPr>
+        <p:cNvPr id="1" name=""/>
+        <p:cNvGrpSpPr/>
+        <p:nvPr/>
+      </p:nvGrpSpPr>
+      <p:grpSpPr>
+        <a:xfrm>
+          <a:off x="0" y="0"/>
+          <a:ext cx="0" cy="0"/>
+          <a:chOff x="0" y="0"/>
+          <a:chExt cx="0" cy="0"/>
+        </a:xfrm>
+      </p:grpSpPr>
+      <p:sp>
+        <p:nvSpPr>
+          <p:cNvPr id="2" name="Title 1"/>
+          <p:cNvSpPr>
+            <a:spLocks noGrp="1"/>
+          </p:cNvSpPr>
+          <p:nvPr>
+            <p:ph type="title"/>
+          </p:nvPr>
+        </p:nvSpPr>
+        <p:spPr/>
+        <p:txBody>
+          <a:bodyPr>
+            <a:normAutofit fontScale="90000"/>
+          </a:bodyPr>
+          <a:lstStyle/>
+          <a:p>
+            <a:r>
+              <a:rPr lang="en-US" dirty="0" smtClean="0"/>
+              <a:t>Clustering – Social </a:t>
+            </a:r>
+            <a:r>
+              <a:rPr lang="en-US" dirty="0" smtClean="0"/>
+              <a:t>Network </a:t>
+            </a:r>
+            <a:r>
+              <a:rPr lang="en-US" dirty="0" smtClean="0"/>
+              <a:t>A</a:t>
+            </a:r>
+            <a:r>
+              <a:rPr lang="en-US" dirty="0" smtClean="0"/>
+              <a:t>nalysis</a:t>
+            </a:r>
+            <a:endParaRPr lang="en-US" dirty="0"/>
+          </a:p>
+        </p:txBody>
+      </p:sp>
+      <p:sp>
+        <p:nvSpPr>
+          <p:cNvPr id="3" name="Content Placeholder 2"/>
+          <p:cNvSpPr>
+            <a:spLocks noGrp="1"/>
+          </p:cNvSpPr>
+          <p:nvPr>
+            <p:ph idx="1"/>
+          </p:nvPr>
+        </p:nvSpPr>
+        <p:spPr/>
+        <p:txBody>
+          <a:bodyPr/>
+          <a:lstStyle/>
+          <a:p>
+            <a:r>
+              <a:rPr lang="en-US" dirty="0" smtClean="0"/>
+              <a:t>Users send mails frequently</a:t>
+            </a:r>
+          </a:p>
+          <a:p>
+            <a:r>
+              <a:rPr lang="en-US" dirty="0" smtClean="0"/>
+              <a:t>Users receive mails frequently</a:t>
+            </a:r>
+          </a:p>
+          <a:p>
+            <a:r>
+              <a:rPr lang="en-US" dirty="0" smtClean="0"/>
+              <a:t>Coherence group of users</a:t>
+            </a:r>
+          </a:p>
+          <a:p>
+            <a:endParaRPr lang="en-US" dirty="0"/>
+          </a:p>
+        </p:txBody>
+      </p:sp>
+      <p:pic>
+        <p:nvPicPr>
+          <p:cNvPr id="7" name="Picture 6" descr="SocialNetworkAnalysis.jpg"/>
+          <p:cNvPicPr>
+            <a:picLocks noChangeAspect="1"/>
+          </p:cNvPicPr>
+          <p:nvPr/>
+        </p:nvPicPr>
+        <p:blipFill>
+          <a:blip r:embed="rId3"/>
+          <a:stretch>
+            <a:fillRect/>
+          </a:stretch>
+        </p:blipFill>
+        <p:spPr>
+          <a:xfrm>
+            <a:off x="5410200" y="4000500"/>
+            <a:ext cx="3505200" cy="2628900"/>
+          </a:xfrm>
+          <a:prstGeom prst="rect">
+            <a:avLst/>
+          </a:prstGeom>
+        </p:spPr>
+      </p:pic>
+      <p:sp>
+        <p:nvSpPr>
+          <p:cNvPr id="5" name="Text Box 10"/>
+          <p:cNvSpPr txBox="1">
+            <a:spLocks noChangeArrowheads="1"/>
+          </p:cNvSpPr>
+          <p:nvPr/>
+        </p:nvSpPr>
+        <p:spPr bwMode="auto">
+          <a:xfrm rot="10800000" flipV="1">
+            <a:off x="0" y="6519446"/>
+            <a:ext cx="1828800" cy="338554"/>
+          </a:xfrm>
+          <a:prstGeom prst="rect">
+            <a:avLst/>
+          </a:prstGeom>
+          <a:noFill/>
+          <a:ln w="9525">
+            <a:noFill/>
+            <a:miter lim="800000"/>
+            <a:headEnd/>
+            <a:tailEnd/>
+          </a:ln>
+          <a:effectLst/>
+        </p:spPr>
+        <p:txBody>
+          <a:bodyPr wrap="square">
+            <a:spAutoFit/>
+          </a:bodyPr>
+          <a:lstStyle/>
+          <a:p>
+            <a:pPr>
+              <a:spcBef>
+                <a:spcPct val="50000"/>
+              </a:spcBef>
+            </a:pPr>
+            <a:r>
+              <a:rPr lang="en-US" sz="1600" b="1" dirty="0">
+                <a:solidFill>
+                  <a:srgbClr val="FF0000"/>
+                </a:solidFill>
+              </a:rPr>
+              <a:t>Image </a:t>
+            </a:r>
+            <a:r>
+              <a:rPr lang="en-US" sz="1600" b="1" dirty="0" err="1" smtClean="0">
+                <a:solidFill>
+                  <a:srgbClr val="FF0000"/>
+                </a:solidFill>
+              </a:rPr>
+              <a:t>ack</a:t>
+            </a:r>
+            <a:r>
+              <a:rPr lang="en-US" sz="1600" b="1" dirty="0" smtClean="0">
+                <a:solidFill>
+                  <a:srgbClr val="FF0000"/>
+                </a:solidFill>
+              </a:rPr>
+              <a:t> – Google</a:t>
+            </a:r>
+            <a:endParaRPr lang="en-US" sz="1600" b="1" dirty="0">
+              <a:solidFill>
+                <a:srgbClr val="FF0000"/>
+              </a:solidFill>
+            </a:endParaRPr>
+          </a:p>
+        </p:txBody>
+      </p:sp>
+    </p:spTree>
+  </p:cSld>
+  <p:clrMapOvr>
+    <a:masterClrMapping/>
+  </p:clrMapOvr>
+  <p:timing>
+    <p:tnLst>
+      <p:par>
+        <p:cTn id="1" dur="indefinite" restart="never" nodeType="tmRoot"/>
+      </p:par>
+    </p:tnLst>
+  </p:timing>
+</p:sld>
+</file>
+
+<file path=ppt/slides/slide9.xml><?xml version="1.0" encoding="utf-8"?>
+<p:sld xmlns:a="http://schemas.openxmlformats.org/drawingml/2006/main" xmlns:r="http://schemas.openxmlformats.org/officeDocument/2006/relationships" xmlns:p="http://schemas.openxmlformats.org/presentationml/2006/main">
+  <p:cSld>
+    <p:spTree>
+      <p:nvGrpSpPr>
+        <p:cNvPr id="1" name=""/>
+        <p:cNvGrpSpPr/>
+        <p:nvPr/>
+      </p:nvGrpSpPr>
+      <p:grpSpPr>
+        <a:xfrm>
+          <a:off x="0" y="0"/>
+          <a:ext cx="0" cy="0"/>
+          <a:chOff x="0" y="0"/>
+          <a:chExt cx="0" cy="0"/>
+        </a:xfrm>
+      </p:grpSpPr>
+      <p:sp>
+        <p:nvSpPr>
+          <p:cNvPr id="2" name="Title 1"/>
+          <p:cNvSpPr>
+            <a:spLocks noGrp="1"/>
+          </p:cNvSpPr>
+          <p:nvPr>
+            <p:ph type="title"/>
+          </p:nvPr>
+        </p:nvSpPr>
+        <p:spPr/>
+        <p:txBody>
+          <a:bodyPr/>
+          <a:lstStyle/>
+          <a:p>
+            <a:r>
+              <a:rPr lang="en-US" dirty="0" smtClean="0"/>
+              <a:t>K Means Clustering Algorithm</a:t>
+            </a:r>
+            <a:endParaRPr lang="en-US" dirty="0"/>
+          </a:p>
+        </p:txBody>
+      </p:sp>
+      <p:sp>
+        <p:nvSpPr>
+          <p:cNvPr id="3" name="Content Placeholder 2"/>
+          <p:cNvSpPr>
+            <a:spLocks noGrp="1"/>
+          </p:cNvSpPr>
+          <p:nvPr>
+            <p:ph idx="1"/>
+          </p:nvPr>
+        </p:nvSpPr>
+        <p:spPr/>
+        <p:txBody>
+          <a:bodyPr>
+            <a:normAutofit fontScale="92500" lnSpcReduction="10000"/>
+          </a:bodyPr>
+          <a:lstStyle/>
+          <a:p>
+            <a:r>
+              <a:rPr lang="en-IN" dirty="0" smtClean="0"/>
+              <a:t>Unsupervised </a:t>
+            </a:r>
+            <a:r>
+              <a:rPr lang="en-IN" dirty="0" smtClean="0"/>
+              <a:t>learning – Unlabeled dataset</a:t>
+            </a:r>
+          </a:p>
+          <a:p>
+            <a:r>
+              <a:rPr lang="en-IN" dirty="0" smtClean="0"/>
+              <a:t>Centroid </a:t>
+            </a:r>
+            <a:r>
+              <a:rPr lang="en-IN" dirty="0" smtClean="0"/>
+              <a:t>based algorithm</a:t>
+            </a:r>
+            <a:endParaRPr lang="en-IN" dirty="0" smtClean="0"/>
+          </a:p>
+          <a:p>
+            <a:r>
+              <a:rPr lang="en-IN" dirty="0" smtClean="0"/>
+              <a:t>Iterative algorithm</a:t>
+            </a:r>
+          </a:p>
+          <a:p>
+            <a:r>
+              <a:rPr lang="en-IN" dirty="0" smtClean="0"/>
+              <a:t>K – Number </a:t>
+            </a:r>
+            <a:r>
+              <a:rPr lang="en-IN" dirty="0" smtClean="0"/>
+              <a:t>of pre-defined </a:t>
+            </a:r>
+            <a:r>
+              <a:rPr lang="en-IN" dirty="0" smtClean="0"/>
+              <a:t>clusters</a:t>
+            </a:r>
+          </a:p>
+          <a:p>
+            <a:r>
+              <a:rPr lang="en-IN" dirty="0" smtClean="0"/>
+              <a:t>Divide dataset into </a:t>
+            </a:r>
+            <a:r>
+              <a:rPr lang="en-IN" dirty="0" smtClean="0"/>
+              <a:t>K different clusters</a:t>
+            </a:r>
+          </a:p>
+          <a:p>
+            <a:r>
+              <a:rPr lang="en-IN" dirty="0" smtClean="0"/>
+              <a:t>Decrease distance between samples from same </a:t>
+            </a:r>
+            <a:r>
+              <a:rPr lang="en-IN" dirty="0" smtClean="0"/>
+              <a:t>cluster</a:t>
+            </a:r>
+          </a:p>
+          <a:p>
+            <a:r>
+              <a:rPr lang="en-IN" dirty="0" smtClean="0"/>
+              <a:t>Increase distance between samples from different clusters</a:t>
             </a:r>
             <a:endParaRPr lang="en-US" dirty="0"/>
           </a:p>

</xml_diff>